<commit_message>
Fixed a typo in the background/stakeholder presentation.
</commit_message>
<xml_diff>
--- a/docs/Meetings/2/2.pptx
+++ b/docs/Meetings/2/2.pptx
@@ -13878,13 +13878,21 @@
           <a:p>
             <a:r>
               <a:rPr lang="en-US" dirty="0"/>
-              <a:t>It’s important to know who the main stakeholders, to prevent project management issues…</a:t>
+              <a:t>It’s important to know who the main stakeholders are, in order to prevent project management issues…</a:t>
             </a:r>
           </a:p>
           <a:p>
             <a:r>
               <a:rPr lang="en-US" dirty="0"/>
-              <a:t>For example, scope creep is prevented by having a set number of features that would be provided. The goal of the project is to provide a private and unified management of income, with cryptocurrencies and stocks being the only two investment categories.</a:t>
+              <a:t>For example, scope creep is prevented by having a set number of features that would be provided. The goal of the project is to provide a private and unified interface </a:t>
+            </a:r>
+            <a:r>
+              <a:rPr lang="en-US"/>
+              <a:t>for the management </a:t>
+            </a:r>
+            <a:r>
+              <a:rPr lang="en-US" dirty="0"/>
+              <a:t>of income, with cryptocurrencies and stocks being the only two investment categories.</a:t>
             </a:r>
           </a:p>
           <a:p>

</xml_diff>

<commit_message>
Updated the PowerPoint presentation of the second meeting.
</commit_message>
<xml_diff>
--- a/docs/Meetings/2/2.pptx
+++ b/docs/Meetings/2/2.pptx
@@ -6,13 +6,18 @@
   </p:sldMasterIdLst>
   <p:sldIdLst>
     <p:sldId id="256" r:id="rId2"/>
-    <p:sldId id="257" r:id="rId3"/>
-    <p:sldId id="258" r:id="rId4"/>
-    <p:sldId id="260" r:id="rId5"/>
-    <p:sldId id="259" r:id="rId6"/>
-    <p:sldId id="263" r:id="rId7"/>
-    <p:sldId id="261" r:id="rId8"/>
-    <p:sldId id="262" r:id="rId9"/>
+    <p:sldId id="265" r:id="rId3"/>
+    <p:sldId id="257" r:id="rId4"/>
+    <p:sldId id="258" r:id="rId5"/>
+    <p:sldId id="260" r:id="rId6"/>
+    <p:sldId id="259" r:id="rId7"/>
+    <p:sldId id="263" r:id="rId8"/>
+    <p:sldId id="261" r:id="rId9"/>
+    <p:sldId id="262" r:id="rId10"/>
+    <p:sldId id="266" r:id="rId11"/>
+    <p:sldId id="264" r:id="rId12"/>
+    <p:sldId id="268" r:id="rId13"/>
+    <p:sldId id="267" r:id="rId14"/>
   </p:sldIdLst>
   <p:sldSz cx="12192000" cy="6858000"/>
   <p:notesSz cx="6858000" cy="9144000"/>
@@ -454,7 +459,7 @@
           <a:p>
             <a:fld id="{5930266A-47E2-AD46-80FA-AF9BB5BD36C8}" type="datetimeFigureOut">
               <a:rPr lang="en-US" smtClean="0"/>
-              <a:t>10/18/21</a:t>
+              <a:t>10/28/21</a:t>
             </a:fld>
             <a:endParaRPr lang="en-US"/>
           </a:p>
@@ -1542,7 +1547,7 @@
           <a:p>
             <a:fld id="{5930266A-47E2-AD46-80FA-AF9BB5BD36C8}" type="datetimeFigureOut">
               <a:rPr lang="en-US" smtClean="0"/>
-              <a:t>10/18/21</a:t>
+              <a:t>10/28/21</a:t>
             </a:fld>
             <a:endParaRPr lang="en-US"/>
           </a:p>
@@ -2522,7 +2527,7 @@
           <a:p>
             <a:fld id="{5930266A-47E2-AD46-80FA-AF9BB5BD36C8}" type="datetimeFigureOut">
               <a:rPr lang="en-US" smtClean="0"/>
-              <a:t>10/18/21</a:t>
+              <a:t>10/28/21</a:t>
             </a:fld>
             <a:endParaRPr lang="en-US"/>
           </a:p>
@@ -3656,7 +3661,7 @@
           <a:p>
             <a:fld id="{5930266A-47E2-AD46-80FA-AF9BB5BD36C8}" type="datetimeFigureOut">
               <a:rPr lang="en-US" smtClean="0"/>
-              <a:t>10/18/21</a:t>
+              <a:t>10/28/21</a:t>
             </a:fld>
             <a:endParaRPr lang="en-US"/>
           </a:p>
@@ -4689,7 +4694,7 @@
           <a:p>
             <a:fld id="{5930266A-47E2-AD46-80FA-AF9BB5BD36C8}" type="datetimeFigureOut">
               <a:rPr lang="en-US" smtClean="0"/>
-              <a:t>10/18/21</a:t>
+              <a:t>10/28/21</a:t>
             </a:fld>
             <a:endParaRPr lang="en-US"/>
           </a:p>
@@ -5349,7 +5354,7 @@
           <a:p>
             <a:fld id="{5930266A-47E2-AD46-80FA-AF9BB5BD36C8}" type="datetimeFigureOut">
               <a:rPr lang="en-US" smtClean="0"/>
-              <a:t>10/18/21</a:t>
+              <a:t>10/28/21</a:t>
             </a:fld>
             <a:endParaRPr lang="en-US"/>
           </a:p>
@@ -6210,7 +6215,7 @@
           <a:p>
             <a:fld id="{5930266A-47E2-AD46-80FA-AF9BB5BD36C8}" type="datetimeFigureOut">
               <a:rPr lang="en-US" smtClean="0"/>
-              <a:t>10/18/21</a:t>
+              <a:t>10/28/21</a:t>
             </a:fld>
             <a:endParaRPr lang="en-US"/>
           </a:p>
@@ -6400,7 +6405,7 @@
           <a:p>
             <a:fld id="{5930266A-47E2-AD46-80FA-AF9BB5BD36C8}" type="datetimeFigureOut">
               <a:rPr lang="en-US" smtClean="0"/>
-              <a:t>10/18/21</a:t>
+              <a:t>10/28/21</a:t>
             </a:fld>
             <a:endParaRPr lang="en-US"/>
           </a:p>
@@ -7372,7 +7377,7 @@
           <a:p>
             <a:fld id="{5930266A-47E2-AD46-80FA-AF9BB5BD36C8}" type="datetimeFigureOut">
               <a:rPr lang="en-US" smtClean="0"/>
-              <a:t>10/18/21</a:t>
+              <a:t>10/28/21</a:t>
             </a:fld>
             <a:endParaRPr lang="en-US"/>
           </a:p>
@@ -7583,7 +7588,7 @@
           <a:p>
             <a:fld id="{5930266A-47E2-AD46-80FA-AF9BB5BD36C8}" type="datetimeFigureOut">
               <a:rPr lang="en-US" smtClean="0"/>
-              <a:t>10/18/21</a:t>
+              <a:t>10/28/21</a:t>
             </a:fld>
             <a:endParaRPr lang="en-US"/>
           </a:p>
@@ -8617,7 +8622,7 @@
           <a:p>
             <a:fld id="{5930266A-47E2-AD46-80FA-AF9BB5BD36C8}" type="datetimeFigureOut">
               <a:rPr lang="en-US" smtClean="0"/>
-              <a:t>10/18/21</a:t>
+              <a:t>10/28/21</a:t>
             </a:fld>
             <a:endParaRPr lang="en-US"/>
           </a:p>
@@ -8889,7 +8894,7 @@
           <a:p>
             <a:fld id="{5930266A-47E2-AD46-80FA-AF9BB5BD36C8}" type="datetimeFigureOut">
               <a:rPr lang="en-US" smtClean="0"/>
-              <a:t>10/18/21</a:t>
+              <a:t>10/28/21</a:t>
             </a:fld>
             <a:endParaRPr lang="en-US"/>
           </a:p>
@@ -9299,7 +9304,7 @@
           <a:p>
             <a:fld id="{5930266A-47E2-AD46-80FA-AF9BB5BD36C8}" type="datetimeFigureOut">
               <a:rPr lang="en-US" smtClean="0"/>
-              <a:t>10/18/21</a:t>
+              <a:t>10/28/21</a:t>
             </a:fld>
             <a:endParaRPr lang="en-US"/>
           </a:p>
@@ -9426,7 +9431,7 @@
           <a:p>
             <a:fld id="{5930266A-47E2-AD46-80FA-AF9BB5BD36C8}" type="datetimeFigureOut">
               <a:rPr lang="en-US" smtClean="0"/>
-              <a:t>10/18/21</a:t>
+              <a:t>10/28/21</a:t>
             </a:fld>
             <a:endParaRPr lang="en-US"/>
           </a:p>
@@ -9521,7 +9526,7 @@
           <a:p>
             <a:fld id="{5930266A-47E2-AD46-80FA-AF9BB5BD36C8}" type="datetimeFigureOut">
               <a:rPr lang="en-US" smtClean="0"/>
-              <a:t>10/18/21</a:t>
+              <a:t>10/28/21</a:t>
             </a:fld>
             <a:endParaRPr lang="en-US"/>
           </a:p>
@@ -10602,7 +10607,7 @@
           <a:p>
             <a:fld id="{5930266A-47E2-AD46-80FA-AF9BB5BD36C8}" type="datetimeFigureOut">
               <a:rPr lang="en-US" smtClean="0"/>
-              <a:t>10/18/21</a:t>
+              <a:t>10/28/21</a:t>
             </a:fld>
             <a:endParaRPr lang="en-US"/>
           </a:p>
@@ -11710,7 +11715,7 @@
           <a:p>
             <a:fld id="{5930266A-47E2-AD46-80FA-AF9BB5BD36C8}" type="datetimeFigureOut">
               <a:rPr lang="en-US" smtClean="0"/>
-              <a:t>10/18/21</a:t>
+              <a:t>10/28/21</a:t>
             </a:fld>
             <a:endParaRPr lang="en-US"/>
           </a:p>
@@ -12707,7 +12712,7 @@
           <a:p>
             <a:fld id="{5930266A-47E2-AD46-80FA-AF9BB5BD36C8}" type="datetimeFigureOut">
               <a:rPr lang="en-US" smtClean="0"/>
-              <a:t>10/18/21</a:t>
+              <a:t>10/28/21</a:t>
             </a:fld>
             <a:endParaRPr lang="en-US"/>
           </a:p>
@@ -13317,7 +13322,7 @@
           <a:p>
             <a:r>
               <a:rPr lang="en-US" dirty="0"/>
-              <a:t>Background &amp; Stakeholders</a:t>
+              <a:t>Background, Stakeholders, And More…</a:t>
             </a:r>
           </a:p>
         </p:txBody>
@@ -13335,7 +13340,850 @@
 </p:sld>
 </file>
 
+<file path=ppt/slides/slide10.xml><?xml version="1.0" encoding="utf-8"?>
+<p:sld xmlns:a="http://schemas.openxmlformats.org/drawingml/2006/main" xmlns:r="http://schemas.openxmlformats.org/officeDocument/2006/relationships" xmlns:p="http://schemas.openxmlformats.org/presentationml/2006/main" showMasterSp="0">
+  <p:cSld>
+    <p:spTree>
+      <p:nvGrpSpPr>
+        <p:cNvPr id="1" name=""/>
+        <p:cNvGrpSpPr/>
+        <p:nvPr/>
+      </p:nvGrpSpPr>
+      <p:grpSpPr>
+        <a:xfrm>
+          <a:off x="0" y="0"/>
+          <a:ext cx="0" cy="0"/>
+          <a:chOff x="0" y="0"/>
+          <a:chExt cx="0" cy="0"/>
+        </a:xfrm>
+      </p:grpSpPr>
+      <p:pic>
+        <p:nvPicPr>
+          <p:cNvPr id="5" name="Content Placeholder 4">
+            <a:extLst>
+              <a:ext uri="{FF2B5EF4-FFF2-40B4-BE49-F238E27FC236}">
+                <a16:creationId xmlns:a16="http://schemas.microsoft.com/office/drawing/2014/main" id="{21746084-C4C7-9B49-9AC8-83C344777F1E}"/>
+              </a:ext>
+            </a:extLst>
+          </p:cNvPr>
+          <p:cNvPicPr>
+            <a:picLocks noGrp="1" noChangeAspect="1"/>
+          </p:cNvPicPr>
+          <p:nvPr>
+            <p:ph idx="1"/>
+          </p:nvPr>
+        </p:nvPicPr>
+        <p:blipFill rotWithShape="1">
+          <a:blip r:embed="rId2"/>
+          <a:srcRect l="11496" t="14243" r="13471" b="11691"/>
+          <a:stretch/>
+        </p:blipFill>
+        <p:spPr>
+          <a:xfrm>
+            <a:off x="71252" y="76369"/>
+            <a:ext cx="5248894" cy="6705262"/>
+          </a:xfrm>
+        </p:spPr>
+      </p:pic>
+      <p:sp>
+        <p:nvSpPr>
+          <p:cNvPr id="8" name="Content Placeholder 2">
+            <a:extLst>
+              <a:ext uri="{FF2B5EF4-FFF2-40B4-BE49-F238E27FC236}">
+                <a16:creationId xmlns:a16="http://schemas.microsoft.com/office/drawing/2014/main" id="{0A4CED9D-BD2D-E049-B55D-2E6719F86F14}"/>
+              </a:ext>
+            </a:extLst>
+          </p:cNvPr>
+          <p:cNvSpPr txBox="1">
+            <a:spLocks/>
+          </p:cNvSpPr>
+          <p:nvPr/>
+        </p:nvSpPr>
+        <p:spPr>
+          <a:xfrm>
+            <a:off x="5489447" y="1109522"/>
+            <a:ext cx="6504631" cy="4249555"/>
+          </a:xfrm>
+          <a:prstGeom prst="rect">
+            <a:avLst/>
+          </a:prstGeom>
+        </p:spPr>
+        <p:txBody>
+          <a:bodyPr vert="horz" lIns="91440" tIns="45720" rIns="91440" bIns="45720" rtlCol="0">
+            <a:normAutofit/>
+          </a:bodyPr>
+          <a:lstStyle>
+            <a:lvl1pPr marL="342900" indent="-342900" algn="l" defTabSz="457200" rtl="0" eaLnBrk="1" latinLnBrk="0" hangingPunct="1">
+              <a:spcBef>
+                <a:spcPts val="1000"/>
+              </a:spcBef>
+              <a:spcAft>
+                <a:spcPts val="0"/>
+              </a:spcAft>
+              <a:buClr>
+                <a:schemeClr val="accent1"/>
+              </a:buClr>
+              <a:buSzPct val="80000"/>
+              <a:buFont typeface="Wingdings 3" charset="2"/>
+              <a:buChar char=""/>
+              <a:defRPr sz="1800" b="0" i="0" kern="1200">
+                <a:solidFill>
+                  <a:schemeClr val="tx1">
+                    <a:lumMod val="75000"/>
+                    <a:lumOff val="25000"/>
+                  </a:schemeClr>
+                </a:solidFill>
+                <a:latin typeface="+mn-lt"/>
+                <a:ea typeface="+mn-ea"/>
+                <a:cs typeface="+mn-cs"/>
+              </a:defRPr>
+            </a:lvl1pPr>
+            <a:lvl2pPr marL="742950" indent="-285750" algn="l" defTabSz="457200" rtl="0" eaLnBrk="1" latinLnBrk="0" hangingPunct="1">
+              <a:spcBef>
+                <a:spcPts val="1000"/>
+              </a:spcBef>
+              <a:spcAft>
+                <a:spcPts val="0"/>
+              </a:spcAft>
+              <a:buClr>
+                <a:schemeClr val="accent1"/>
+              </a:buClr>
+              <a:buSzPct val="80000"/>
+              <a:buFont typeface="Wingdings 3" charset="2"/>
+              <a:buChar char=""/>
+              <a:defRPr sz="1600" b="0" i="0" kern="1200">
+                <a:solidFill>
+                  <a:schemeClr val="tx1">
+                    <a:lumMod val="75000"/>
+                    <a:lumOff val="25000"/>
+                  </a:schemeClr>
+                </a:solidFill>
+                <a:latin typeface="+mn-lt"/>
+                <a:ea typeface="+mn-ea"/>
+                <a:cs typeface="+mn-cs"/>
+              </a:defRPr>
+            </a:lvl2pPr>
+            <a:lvl3pPr marL="1143000" indent="-228600" algn="l" defTabSz="457200" rtl="0" eaLnBrk="1" latinLnBrk="0" hangingPunct="1">
+              <a:spcBef>
+                <a:spcPts val="1000"/>
+              </a:spcBef>
+              <a:spcAft>
+                <a:spcPts val="0"/>
+              </a:spcAft>
+              <a:buClr>
+                <a:schemeClr val="accent1"/>
+              </a:buClr>
+              <a:buSzPct val="80000"/>
+              <a:buFont typeface="Wingdings 3" charset="2"/>
+              <a:buChar char=""/>
+              <a:defRPr sz="1400" b="0" i="0" kern="1200">
+                <a:solidFill>
+                  <a:schemeClr val="tx1">
+                    <a:lumMod val="75000"/>
+                    <a:lumOff val="25000"/>
+                  </a:schemeClr>
+                </a:solidFill>
+                <a:latin typeface="+mn-lt"/>
+                <a:ea typeface="+mn-ea"/>
+                <a:cs typeface="+mn-cs"/>
+              </a:defRPr>
+            </a:lvl3pPr>
+            <a:lvl4pPr marL="1600200" indent="-228600" algn="l" defTabSz="457200" rtl="0" eaLnBrk="1" latinLnBrk="0" hangingPunct="1">
+              <a:spcBef>
+                <a:spcPts val="1000"/>
+              </a:spcBef>
+              <a:spcAft>
+                <a:spcPts val="0"/>
+              </a:spcAft>
+              <a:buClr>
+                <a:schemeClr val="accent1"/>
+              </a:buClr>
+              <a:buSzPct val="80000"/>
+              <a:buFont typeface="Wingdings 3" charset="2"/>
+              <a:buChar char=""/>
+              <a:defRPr sz="1200" b="0" i="0" kern="1200">
+                <a:solidFill>
+                  <a:schemeClr val="tx1">
+                    <a:lumMod val="75000"/>
+                    <a:lumOff val="25000"/>
+                  </a:schemeClr>
+                </a:solidFill>
+                <a:latin typeface="+mn-lt"/>
+                <a:ea typeface="+mn-ea"/>
+                <a:cs typeface="+mn-cs"/>
+              </a:defRPr>
+            </a:lvl4pPr>
+            <a:lvl5pPr marL="2057400" indent="-228600" algn="l" defTabSz="457200" rtl="0" eaLnBrk="1" latinLnBrk="0" hangingPunct="1">
+              <a:spcBef>
+                <a:spcPts val="1000"/>
+              </a:spcBef>
+              <a:spcAft>
+                <a:spcPts val="0"/>
+              </a:spcAft>
+              <a:buClr>
+                <a:schemeClr val="accent1"/>
+              </a:buClr>
+              <a:buSzPct val="80000"/>
+              <a:buFont typeface="Wingdings 3" charset="2"/>
+              <a:buChar char=""/>
+              <a:defRPr sz="1200" b="0" i="0" kern="1200">
+                <a:solidFill>
+                  <a:schemeClr val="tx1">
+                    <a:lumMod val="75000"/>
+                    <a:lumOff val="25000"/>
+                  </a:schemeClr>
+                </a:solidFill>
+                <a:latin typeface="+mn-lt"/>
+                <a:ea typeface="+mn-ea"/>
+                <a:cs typeface="+mn-cs"/>
+              </a:defRPr>
+            </a:lvl5pPr>
+            <a:lvl6pPr marL="2514600" indent="-228600" algn="l" defTabSz="457200" rtl="0" eaLnBrk="1" latinLnBrk="0" hangingPunct="1">
+              <a:spcBef>
+                <a:spcPts val="1000"/>
+              </a:spcBef>
+              <a:spcAft>
+                <a:spcPts val="0"/>
+              </a:spcAft>
+              <a:buClr>
+                <a:schemeClr val="accent1"/>
+              </a:buClr>
+              <a:buSzPct val="80000"/>
+              <a:buFont typeface="Wingdings 3" charset="2"/>
+              <a:buChar char=""/>
+              <a:defRPr sz="1200" b="0" i="0" kern="1200">
+                <a:solidFill>
+                  <a:schemeClr val="tx1">
+                    <a:lumMod val="75000"/>
+                    <a:lumOff val="25000"/>
+                  </a:schemeClr>
+                </a:solidFill>
+                <a:latin typeface="+mn-lt"/>
+                <a:ea typeface="+mn-ea"/>
+                <a:cs typeface="+mn-cs"/>
+              </a:defRPr>
+            </a:lvl6pPr>
+            <a:lvl7pPr marL="2971800" indent="-228600" algn="l" defTabSz="457200" rtl="0" eaLnBrk="1" latinLnBrk="0" hangingPunct="1">
+              <a:spcBef>
+                <a:spcPts val="1000"/>
+              </a:spcBef>
+              <a:spcAft>
+                <a:spcPts val="0"/>
+              </a:spcAft>
+              <a:buClr>
+                <a:schemeClr val="accent1"/>
+              </a:buClr>
+              <a:buSzPct val="80000"/>
+              <a:buFont typeface="Wingdings 3" charset="2"/>
+              <a:buChar char=""/>
+              <a:defRPr sz="1200" b="0" i="0" kern="1200">
+                <a:solidFill>
+                  <a:schemeClr val="tx1">
+                    <a:lumMod val="75000"/>
+                    <a:lumOff val="25000"/>
+                  </a:schemeClr>
+                </a:solidFill>
+                <a:latin typeface="+mn-lt"/>
+                <a:ea typeface="+mn-ea"/>
+                <a:cs typeface="+mn-cs"/>
+              </a:defRPr>
+            </a:lvl7pPr>
+            <a:lvl8pPr marL="3429000" indent="-228600" algn="l" defTabSz="457200" rtl="0" eaLnBrk="1" latinLnBrk="0" hangingPunct="1">
+              <a:spcBef>
+                <a:spcPts val="1000"/>
+              </a:spcBef>
+              <a:spcAft>
+                <a:spcPts val="0"/>
+              </a:spcAft>
+              <a:buClr>
+                <a:schemeClr val="accent1"/>
+              </a:buClr>
+              <a:buSzPct val="80000"/>
+              <a:buFont typeface="Wingdings 3" charset="2"/>
+              <a:buChar char=""/>
+              <a:defRPr sz="1200" b="0" i="0" kern="1200">
+                <a:solidFill>
+                  <a:schemeClr val="tx1">
+                    <a:lumMod val="75000"/>
+                    <a:lumOff val="25000"/>
+                  </a:schemeClr>
+                </a:solidFill>
+                <a:latin typeface="+mn-lt"/>
+                <a:ea typeface="+mn-ea"/>
+                <a:cs typeface="+mn-cs"/>
+              </a:defRPr>
+            </a:lvl8pPr>
+            <a:lvl9pPr marL="3886200" indent="-228600" algn="l" defTabSz="457200" rtl="0" eaLnBrk="1" latinLnBrk="0" hangingPunct="1">
+              <a:spcBef>
+                <a:spcPts val="1000"/>
+              </a:spcBef>
+              <a:spcAft>
+                <a:spcPts val="0"/>
+              </a:spcAft>
+              <a:buClr>
+                <a:schemeClr val="accent1"/>
+              </a:buClr>
+              <a:buSzPct val="80000"/>
+              <a:buFont typeface="Wingdings 3" charset="2"/>
+              <a:buChar char=""/>
+              <a:defRPr sz="1200" b="0" i="0" kern="1200">
+                <a:solidFill>
+                  <a:schemeClr val="tx1">
+                    <a:lumMod val="75000"/>
+                    <a:lumOff val="25000"/>
+                  </a:schemeClr>
+                </a:solidFill>
+                <a:latin typeface="+mn-lt"/>
+                <a:ea typeface="+mn-ea"/>
+                <a:cs typeface="+mn-cs"/>
+              </a:defRPr>
+            </a:lvl9pPr>
+          </a:lstStyle>
+          <a:p>
+            <a:r>
+              <a:rPr lang="en-US" dirty="0"/>
+              <a:t>2 week sprints.</a:t>
+            </a:r>
+          </a:p>
+          <a:p>
+            <a:r>
+              <a:rPr lang="en-US" dirty="0"/>
+              <a:t>8 sprints total.</a:t>
+            </a:r>
+          </a:p>
+          <a:p>
+            <a:r>
+              <a:rPr lang="en-US" dirty="0"/>
+              <a:t>8 hour work days.</a:t>
+            </a:r>
+          </a:p>
+          <a:p>
+            <a:r>
+              <a:rPr lang="en-US" dirty="0"/>
+              <a:t>40 hour weeks.</a:t>
+            </a:r>
+          </a:p>
+          <a:p>
+            <a:r>
+              <a:rPr lang="en-US" dirty="0"/>
+              <a:t>20 day months.</a:t>
+            </a:r>
+          </a:p>
+          <a:p>
+            <a:r>
+              <a:rPr lang="en-US" dirty="0"/>
+              <a:t>Each task/feature beyond and including sprint 4 needs to be developed on 3 platforms: web, desktop, and mobile.</a:t>
+            </a:r>
+          </a:p>
+          <a:p>
+            <a:r>
+              <a:rPr lang="en-US" dirty="0"/>
+              <a:t>The chosen tech stack ensures high quality code and efficient debugging/testing procedures by having 1 primary programming language for the entire codebase.</a:t>
+            </a:r>
+          </a:p>
+        </p:txBody>
+      </p:sp>
+      <p:sp>
+        <p:nvSpPr>
+          <p:cNvPr id="9" name="Title 1">
+            <a:extLst>
+              <a:ext uri="{FF2B5EF4-FFF2-40B4-BE49-F238E27FC236}">
+                <a16:creationId xmlns:a16="http://schemas.microsoft.com/office/drawing/2014/main" id="{F28B59FA-DA79-454B-8137-0B4CB4BAD39A}"/>
+              </a:ext>
+            </a:extLst>
+          </p:cNvPr>
+          <p:cNvSpPr>
+            <a:spLocks noGrp="1"/>
+          </p:cNvSpPr>
+          <p:nvPr>
+            <p:ph type="title"/>
+          </p:nvPr>
+        </p:nvSpPr>
+        <p:spPr>
+          <a:xfrm>
+            <a:off x="5489448" y="225522"/>
+            <a:ext cx="4188942" cy="706964"/>
+          </a:xfrm>
+        </p:spPr>
+        <p:txBody>
+          <a:bodyPr/>
+          <a:lstStyle/>
+          <a:p>
+            <a:r>
+              <a:rPr lang="en-US" dirty="0">
+                <a:solidFill>
+                  <a:schemeClr val="tx1">
+                    <a:lumMod val="75000"/>
+                    <a:lumOff val="25000"/>
+                  </a:schemeClr>
+                </a:solidFill>
+              </a:rPr>
+              <a:t>Product Backlog</a:t>
+            </a:r>
+          </a:p>
+        </p:txBody>
+      </p:sp>
+    </p:spTree>
+    <p:extLst>
+      <p:ext uri="{BB962C8B-B14F-4D97-AF65-F5344CB8AC3E}">
+        <p14:creationId xmlns:p14="http://schemas.microsoft.com/office/powerpoint/2010/main" val="3726267329"/>
+      </p:ext>
+    </p:extLst>
+  </p:cSld>
+  <p:clrMapOvr>
+    <a:masterClrMapping/>
+  </p:clrMapOvr>
+</p:sld>
+</file>
+
+<file path=ppt/slides/slide11.xml><?xml version="1.0" encoding="utf-8"?>
+<p:sld xmlns:a="http://schemas.openxmlformats.org/drawingml/2006/main" xmlns:r="http://schemas.openxmlformats.org/officeDocument/2006/relationships" xmlns:p="http://schemas.openxmlformats.org/presentationml/2006/main" showMasterSp="0">
+  <p:cSld>
+    <p:spTree>
+      <p:nvGrpSpPr>
+        <p:cNvPr id="1" name=""/>
+        <p:cNvGrpSpPr/>
+        <p:nvPr/>
+      </p:nvGrpSpPr>
+      <p:grpSpPr>
+        <a:xfrm>
+          <a:off x="0" y="0"/>
+          <a:ext cx="0" cy="0"/>
+          <a:chOff x="0" y="0"/>
+          <a:chExt cx="0" cy="0"/>
+        </a:xfrm>
+      </p:grpSpPr>
+      <p:pic>
+        <p:nvPicPr>
+          <p:cNvPr id="5" name="Content Placeholder 4">
+            <a:extLst>
+              <a:ext uri="{FF2B5EF4-FFF2-40B4-BE49-F238E27FC236}">
+                <a16:creationId xmlns:a16="http://schemas.microsoft.com/office/drawing/2014/main" id="{3C46440A-BAE2-104B-ABB8-5F7E10FAC17A}"/>
+              </a:ext>
+            </a:extLst>
+          </p:cNvPr>
+          <p:cNvPicPr>
+            <a:picLocks noGrp="1" noChangeAspect="1"/>
+          </p:cNvPicPr>
+          <p:nvPr>
+            <p:ph idx="1"/>
+          </p:nvPr>
+        </p:nvPicPr>
+        <p:blipFill rotWithShape="1">
+          <a:blip r:embed="rId2"/>
+          <a:srcRect l="7469"/>
+          <a:stretch/>
+        </p:blipFill>
+        <p:spPr>
+          <a:xfrm>
+            <a:off x="1376548" y="47873"/>
+            <a:ext cx="9438904" cy="6762254"/>
+          </a:xfrm>
+        </p:spPr>
+      </p:pic>
+    </p:spTree>
+    <p:extLst>
+      <p:ext uri="{BB962C8B-B14F-4D97-AF65-F5344CB8AC3E}">
+        <p14:creationId xmlns:p14="http://schemas.microsoft.com/office/powerpoint/2010/main" val="4201427782"/>
+      </p:ext>
+    </p:extLst>
+  </p:cSld>
+  <p:clrMapOvr>
+    <a:masterClrMapping/>
+  </p:clrMapOvr>
+</p:sld>
+</file>
+
+<file path=ppt/slides/slide12.xml><?xml version="1.0" encoding="utf-8"?>
+<p:sld xmlns:a="http://schemas.openxmlformats.org/drawingml/2006/main" xmlns:r="http://schemas.openxmlformats.org/officeDocument/2006/relationships" xmlns:p="http://schemas.openxmlformats.org/presentationml/2006/main" showMasterSp="0">
+  <p:cSld>
+    <p:spTree>
+      <p:nvGrpSpPr>
+        <p:cNvPr id="1" name=""/>
+        <p:cNvGrpSpPr/>
+        <p:nvPr/>
+      </p:nvGrpSpPr>
+      <p:grpSpPr>
+        <a:xfrm>
+          <a:off x="0" y="0"/>
+          <a:ext cx="0" cy="0"/>
+          <a:chOff x="0" y="0"/>
+          <a:chExt cx="0" cy="0"/>
+        </a:xfrm>
+      </p:grpSpPr>
+      <p:pic>
+        <p:nvPicPr>
+          <p:cNvPr id="7" name="Content Placeholder 6">
+            <a:extLst>
+              <a:ext uri="{FF2B5EF4-FFF2-40B4-BE49-F238E27FC236}">
+                <a16:creationId xmlns:a16="http://schemas.microsoft.com/office/drawing/2014/main" id="{916A2223-EB4A-034F-90D4-A793A0FDAFC2}"/>
+              </a:ext>
+            </a:extLst>
+          </p:cNvPr>
+          <p:cNvPicPr>
+            <a:picLocks noGrp="1" noChangeAspect="1"/>
+          </p:cNvPicPr>
+          <p:nvPr>
+            <p:ph idx="1"/>
+          </p:nvPr>
+        </p:nvPicPr>
+        <p:blipFill>
+          <a:blip r:embed="rId2"/>
+          <a:stretch>
+            <a:fillRect/>
+          </a:stretch>
+        </p:blipFill>
+        <p:spPr>
+          <a:xfrm>
+            <a:off x="1667089" y="371435"/>
+            <a:ext cx="8857821" cy="6115130"/>
+          </a:xfrm>
+        </p:spPr>
+      </p:pic>
+      <p:sp>
+        <p:nvSpPr>
+          <p:cNvPr id="6" name="Title 1">
+            <a:extLst>
+              <a:ext uri="{FF2B5EF4-FFF2-40B4-BE49-F238E27FC236}">
+                <a16:creationId xmlns:a16="http://schemas.microsoft.com/office/drawing/2014/main" id="{AE7FD0B8-2022-6749-B3E4-B440A0668115}"/>
+              </a:ext>
+            </a:extLst>
+          </p:cNvPr>
+          <p:cNvSpPr>
+            <a:spLocks noGrp="1"/>
+          </p:cNvSpPr>
+          <p:nvPr>
+            <p:ph type="title"/>
+          </p:nvPr>
+        </p:nvSpPr>
+        <p:spPr>
+          <a:xfrm>
+            <a:off x="106877" y="6008914"/>
+            <a:ext cx="5391397" cy="706964"/>
+          </a:xfrm>
+        </p:spPr>
+        <p:txBody>
+          <a:bodyPr/>
+          <a:lstStyle/>
+          <a:p>
+            <a:r>
+              <a:rPr lang="en-US" dirty="0">
+                <a:solidFill>
+                  <a:schemeClr val="tx1">
+                    <a:lumMod val="75000"/>
+                    <a:lumOff val="25000"/>
+                  </a:schemeClr>
+                </a:solidFill>
+              </a:rPr>
+              <a:t>ERD – Plaintext</a:t>
+            </a:r>
+          </a:p>
+        </p:txBody>
+      </p:sp>
+    </p:spTree>
+    <p:extLst>
+      <p:ext uri="{BB962C8B-B14F-4D97-AF65-F5344CB8AC3E}">
+        <p14:creationId xmlns:p14="http://schemas.microsoft.com/office/powerpoint/2010/main" val="649861860"/>
+      </p:ext>
+    </p:extLst>
+  </p:cSld>
+  <p:clrMapOvr>
+    <a:masterClrMapping/>
+  </p:clrMapOvr>
+</p:sld>
+</file>
+
+<file path=ppt/slides/slide13.xml><?xml version="1.0" encoding="utf-8"?>
+<p:sld xmlns:a="http://schemas.openxmlformats.org/drawingml/2006/main" xmlns:r="http://schemas.openxmlformats.org/officeDocument/2006/relationships" xmlns:p="http://schemas.openxmlformats.org/presentationml/2006/main" showMasterSp="0">
+  <p:cSld>
+    <p:spTree>
+      <p:nvGrpSpPr>
+        <p:cNvPr id="1" name=""/>
+        <p:cNvGrpSpPr/>
+        <p:nvPr/>
+      </p:nvGrpSpPr>
+      <p:grpSpPr>
+        <a:xfrm>
+          <a:off x="0" y="0"/>
+          <a:ext cx="0" cy="0"/>
+          <a:chOff x="0" y="0"/>
+          <a:chExt cx="0" cy="0"/>
+        </a:xfrm>
+      </p:grpSpPr>
+      <p:pic>
+        <p:nvPicPr>
+          <p:cNvPr id="5" name="Content Placeholder 4">
+            <a:extLst>
+              <a:ext uri="{FF2B5EF4-FFF2-40B4-BE49-F238E27FC236}">
+                <a16:creationId xmlns:a16="http://schemas.microsoft.com/office/drawing/2014/main" id="{BAF5B7F8-1AD8-FA4B-8ABE-6FA84E2D7D2F}"/>
+              </a:ext>
+            </a:extLst>
+          </p:cNvPr>
+          <p:cNvPicPr>
+            <a:picLocks noGrp="1" noChangeAspect="1"/>
+          </p:cNvPicPr>
+          <p:nvPr>
+            <p:ph idx="1"/>
+          </p:nvPr>
+        </p:nvPicPr>
+        <p:blipFill>
+          <a:blip r:embed="rId2">
+            <a:extLst>
+              <a:ext uri="{96DAC541-7B7A-43D3-8B79-37D633B846F1}">
+                <asvg:svgBlip xmlns:asvg="http://schemas.microsoft.com/office/drawing/2016/SVG/main" r:embed="rId3"/>
+              </a:ext>
+            </a:extLst>
+          </a:blip>
+          <a:stretch>
+            <a:fillRect/>
+          </a:stretch>
+        </p:blipFill>
+        <p:spPr>
+          <a:xfrm>
+            <a:off x="1637438" y="310709"/>
+            <a:ext cx="8860536" cy="6197006"/>
+          </a:xfrm>
+        </p:spPr>
+      </p:pic>
+      <p:sp>
+        <p:nvSpPr>
+          <p:cNvPr id="6" name="Title 1">
+            <a:extLst>
+              <a:ext uri="{FF2B5EF4-FFF2-40B4-BE49-F238E27FC236}">
+                <a16:creationId xmlns:a16="http://schemas.microsoft.com/office/drawing/2014/main" id="{AE7FD0B8-2022-6749-B3E4-B440A0668115}"/>
+              </a:ext>
+            </a:extLst>
+          </p:cNvPr>
+          <p:cNvSpPr>
+            <a:spLocks noGrp="1"/>
+          </p:cNvSpPr>
+          <p:nvPr>
+            <p:ph type="title"/>
+          </p:nvPr>
+        </p:nvSpPr>
+        <p:spPr>
+          <a:xfrm>
+            <a:off x="106878" y="6008914"/>
+            <a:ext cx="4073236" cy="706964"/>
+          </a:xfrm>
+        </p:spPr>
+        <p:txBody>
+          <a:bodyPr/>
+          <a:lstStyle/>
+          <a:p>
+            <a:r>
+              <a:rPr lang="en-US" dirty="0">
+                <a:solidFill>
+                  <a:schemeClr val="tx1">
+                    <a:lumMod val="75000"/>
+                    <a:lumOff val="25000"/>
+                  </a:schemeClr>
+                </a:solidFill>
+              </a:rPr>
+              <a:t>ERD - Encrypted</a:t>
+            </a:r>
+          </a:p>
+        </p:txBody>
+      </p:sp>
+    </p:spTree>
+    <p:extLst>
+      <p:ext uri="{BB962C8B-B14F-4D97-AF65-F5344CB8AC3E}">
+        <p14:creationId xmlns:p14="http://schemas.microsoft.com/office/powerpoint/2010/main" val="130188867"/>
+      </p:ext>
+    </p:extLst>
+  </p:cSld>
+  <p:clrMapOvr>
+    <a:masterClrMapping/>
+  </p:clrMapOvr>
+</p:sld>
+</file>
+
 <file path=ppt/slides/slide2.xml><?xml version="1.0" encoding="utf-8"?>
+<p:sld xmlns:a="http://schemas.openxmlformats.org/drawingml/2006/main" xmlns:r="http://schemas.openxmlformats.org/officeDocument/2006/relationships" xmlns:p="http://schemas.openxmlformats.org/presentationml/2006/main">
+  <p:cSld>
+    <p:spTree>
+      <p:nvGrpSpPr>
+        <p:cNvPr id="1" name=""/>
+        <p:cNvGrpSpPr/>
+        <p:nvPr/>
+      </p:nvGrpSpPr>
+      <p:grpSpPr>
+        <a:xfrm>
+          <a:off x="0" y="0"/>
+          <a:ext cx="0" cy="0"/>
+          <a:chOff x="0" y="0"/>
+          <a:chExt cx="0" cy="0"/>
+        </a:xfrm>
+      </p:grpSpPr>
+      <p:sp>
+        <p:nvSpPr>
+          <p:cNvPr id="6" name="Rounded Rectangle 5">
+            <a:extLst>
+              <a:ext uri="{FF2B5EF4-FFF2-40B4-BE49-F238E27FC236}">
+                <a16:creationId xmlns:a16="http://schemas.microsoft.com/office/drawing/2014/main" id="{4A2973D3-38F5-2548-B03C-EA95613E2FE7}"/>
+              </a:ext>
+            </a:extLst>
+          </p:cNvPr>
+          <p:cNvSpPr/>
+          <p:nvPr/>
+        </p:nvSpPr>
+        <p:spPr>
+          <a:xfrm>
+            <a:off x="597724" y="2603500"/>
+            <a:ext cx="10996551" cy="3491345"/>
+          </a:xfrm>
+          <a:prstGeom prst="roundRect">
+            <a:avLst/>
+          </a:prstGeom>
+          <a:solidFill>
+            <a:schemeClr val="bg1">
+              <a:lumMod val="95000"/>
+            </a:schemeClr>
+          </a:solidFill>
+          <a:ln>
+            <a:noFill/>
+          </a:ln>
+          <a:effectLst>
+            <a:outerShdw blurRad="50800" dist="38100" dir="8100000" algn="tr" rotWithShape="0">
+              <a:prstClr val="black">
+                <a:alpha val="40000"/>
+              </a:prstClr>
+            </a:outerShdw>
+          </a:effectLst>
+        </p:spPr>
+        <p:style>
+          <a:lnRef idx="2">
+            <a:schemeClr val="accent6"/>
+          </a:lnRef>
+          <a:fillRef idx="1">
+            <a:schemeClr val="lt1"/>
+          </a:fillRef>
+          <a:effectRef idx="0">
+            <a:schemeClr val="accent6"/>
+          </a:effectRef>
+          <a:fontRef idx="minor">
+            <a:schemeClr val="dk1"/>
+          </a:fontRef>
+        </p:style>
+        <p:txBody>
+          <a:bodyPr rtlCol="0" anchor="ctr"/>
+          <a:lstStyle/>
+          <a:p>
+            <a:pPr algn="ctr"/>
+            <a:endParaRPr lang="en-US" dirty="0"/>
+          </a:p>
+        </p:txBody>
+      </p:sp>
+      <p:sp>
+        <p:nvSpPr>
+          <p:cNvPr id="2" name="Title 1">
+            <a:extLst>
+              <a:ext uri="{FF2B5EF4-FFF2-40B4-BE49-F238E27FC236}">
+                <a16:creationId xmlns:a16="http://schemas.microsoft.com/office/drawing/2014/main" id="{5FDFF24F-A224-BE4E-8D08-9F1C85764B69}"/>
+              </a:ext>
+            </a:extLst>
+          </p:cNvPr>
+          <p:cNvSpPr>
+            <a:spLocks noGrp="1"/>
+          </p:cNvSpPr>
+          <p:nvPr>
+            <p:ph type="title"/>
+          </p:nvPr>
+        </p:nvSpPr>
+        <p:spPr/>
+        <p:txBody>
+          <a:bodyPr/>
+          <a:lstStyle/>
+          <a:p>
+            <a:r>
+              <a:rPr lang="en-US" dirty="0"/>
+              <a:t>Project Vision</a:t>
+            </a:r>
+          </a:p>
+        </p:txBody>
+      </p:sp>
+      <p:sp>
+        <p:nvSpPr>
+          <p:cNvPr id="3" name="Content Placeholder 2">
+            <a:extLst>
+              <a:ext uri="{FF2B5EF4-FFF2-40B4-BE49-F238E27FC236}">
+                <a16:creationId xmlns:a16="http://schemas.microsoft.com/office/drawing/2014/main" id="{8DEE776D-3469-3D40-8C90-050EE9422036}"/>
+              </a:ext>
+            </a:extLst>
+          </p:cNvPr>
+          <p:cNvSpPr>
+            <a:spLocks noGrp="1"/>
+          </p:cNvSpPr>
+          <p:nvPr>
+            <p:ph idx="1"/>
+          </p:nvPr>
+        </p:nvSpPr>
+        <p:spPr>
+          <a:xfrm>
+            <a:off x="3955385" y="3541271"/>
+            <a:ext cx="7463723" cy="1615802"/>
+          </a:xfrm>
+        </p:spPr>
+        <p:txBody>
+          <a:bodyPr>
+            <a:normAutofit/>
+          </a:bodyPr>
+          <a:lstStyle/>
+          <a:p>
+            <a:pPr marL="0" indent="0">
+              <a:buNone/>
+            </a:pPr>
+            <a:r>
+              <a:rPr lang="en-US" dirty="0"/>
+              <a:t>Contrived for investors and the financially diligent, who lack the ability to manage their finances privately and securely, CryptoShare is a self-hosted and open-source solution that allows them to track their income and investments through a unified interface featuring a website, desktop app, and mobile app.</a:t>
+            </a:r>
+          </a:p>
+        </p:txBody>
+      </p:sp>
+      <p:pic>
+        <p:nvPicPr>
+          <p:cNvPr id="5" name="Picture 4">
+            <a:extLst>
+              <a:ext uri="{FF2B5EF4-FFF2-40B4-BE49-F238E27FC236}">
+                <a16:creationId xmlns:a16="http://schemas.microsoft.com/office/drawing/2014/main" id="{2810943C-F493-F94F-9985-B99FAA551747}"/>
+              </a:ext>
+            </a:extLst>
+          </p:cNvPr>
+          <p:cNvPicPr>
+            <a:picLocks noChangeAspect="1"/>
+          </p:cNvPicPr>
+          <p:nvPr/>
+        </p:nvPicPr>
+        <p:blipFill>
+          <a:blip r:embed="rId2"/>
+          <a:stretch>
+            <a:fillRect/>
+          </a:stretch>
+        </p:blipFill>
+        <p:spPr>
+          <a:xfrm>
+            <a:off x="738167" y="2793422"/>
+            <a:ext cx="3111500" cy="3111500"/>
+          </a:xfrm>
+          <a:prstGeom prst="rect">
+            <a:avLst/>
+          </a:prstGeom>
+        </p:spPr>
+      </p:pic>
+    </p:spTree>
+    <p:extLst>
+      <p:ext uri="{BB962C8B-B14F-4D97-AF65-F5344CB8AC3E}">
+        <p14:creationId xmlns:p14="http://schemas.microsoft.com/office/powerpoint/2010/main" val="3013425874"/>
+      </p:ext>
+    </p:extLst>
+  </p:cSld>
+  <p:clrMapOvr>
+    <a:masterClrMapping/>
+  </p:clrMapOvr>
+</p:sld>
+</file>
+
+<file path=ppt/slides/slide3.xml><?xml version="1.0" encoding="utf-8"?>
 <p:sld xmlns:a="http://schemas.openxmlformats.org/drawingml/2006/main" xmlns:r="http://schemas.openxmlformats.org/officeDocument/2006/relationships" xmlns:p="http://schemas.openxmlformats.org/presentationml/2006/main">
   <p:cSld>
     <p:spTree>
@@ -13461,7 +14309,7 @@
 </p:sld>
 </file>
 
-<file path=ppt/slides/slide3.xml><?xml version="1.0" encoding="utf-8"?>
+<file path=ppt/slides/slide4.xml><?xml version="1.0" encoding="utf-8"?>
 <p:sld xmlns:a="http://schemas.openxmlformats.org/drawingml/2006/main" xmlns:r="http://schemas.openxmlformats.org/officeDocument/2006/relationships" xmlns:p="http://schemas.openxmlformats.org/presentationml/2006/main">
   <p:cSld>
     <p:spTree>
@@ -13618,7 +14466,7 @@
 </p:sld>
 </file>
 
-<file path=ppt/slides/slide4.xml><?xml version="1.0" encoding="utf-8"?>
+<file path=ppt/slides/slide5.xml><?xml version="1.0" encoding="utf-8"?>
 <p:sld xmlns:a="http://schemas.openxmlformats.org/drawingml/2006/main" xmlns:r="http://schemas.openxmlformats.org/officeDocument/2006/relationships" xmlns:p="http://schemas.openxmlformats.org/presentationml/2006/main">
   <p:cSld>
     <p:spTree>
@@ -13704,7 +14552,7 @@
 </p:sld>
 </file>
 
-<file path=ppt/slides/slide5.xml><?xml version="1.0" encoding="utf-8"?>
+<file path=ppt/slides/slide6.xml><?xml version="1.0" encoding="utf-8"?>
 <p:sld xmlns:a="http://schemas.openxmlformats.org/drawingml/2006/main" xmlns:r="http://schemas.openxmlformats.org/officeDocument/2006/relationships" xmlns:p="http://schemas.openxmlformats.org/presentationml/2006/main">
   <p:cSld>
     <p:spTree>
@@ -13802,7 +14650,7 @@
 </p:sld>
 </file>
 
-<file path=ppt/slides/slide6.xml><?xml version="1.0" encoding="utf-8"?>
+<file path=ppt/slides/slide7.xml><?xml version="1.0" encoding="utf-8"?>
 <p:sld xmlns:a="http://schemas.openxmlformats.org/drawingml/2006/main" xmlns:r="http://schemas.openxmlformats.org/officeDocument/2006/relationships" xmlns:p="http://schemas.openxmlformats.org/presentationml/2006/main">
   <p:cSld>
     <p:spTree>
@@ -13916,7 +14764,7 @@
 </p:sld>
 </file>
 
-<file path=ppt/slides/slide7.xml><?xml version="1.0" encoding="utf-8"?>
+<file path=ppt/slides/slide8.xml><?xml version="1.0" encoding="utf-8"?>
 <p:sld xmlns:a="http://schemas.openxmlformats.org/drawingml/2006/main" xmlns:r="http://schemas.openxmlformats.org/officeDocument/2006/relationships" xmlns:p="http://schemas.openxmlformats.org/presentationml/2006/main">
   <p:cSld>
     <p:spTree>
@@ -14152,7 +15000,7 @@
 </p:sld>
 </file>
 
-<file path=ppt/slides/slide8.xml><?xml version="1.0" encoding="utf-8"?>
+<file path=ppt/slides/slide9.xml><?xml version="1.0" encoding="utf-8"?>
 <p:sld xmlns:a="http://schemas.openxmlformats.org/drawingml/2006/main" xmlns:r="http://schemas.openxmlformats.org/officeDocument/2006/relationships" xmlns:p="http://schemas.openxmlformats.org/presentationml/2006/main">
   <p:cSld>
     <p:spTree>

</xml_diff>

<commit_message>
The ERDs now include the "Message" table.
</commit_message>
<xml_diff>
--- a/docs/Meetings/2/2.pptx
+++ b/docs/Meetings/2/2.pptx
@@ -13811,35 +13811,6 @@
           <a:chExt cx="0" cy="0"/>
         </a:xfrm>
       </p:grpSpPr>
-      <p:pic>
-        <p:nvPicPr>
-          <p:cNvPr id="7" name="Content Placeholder 6">
-            <a:extLst>
-              <a:ext uri="{FF2B5EF4-FFF2-40B4-BE49-F238E27FC236}">
-                <a16:creationId xmlns:a16="http://schemas.microsoft.com/office/drawing/2014/main" id="{916A2223-EB4A-034F-90D4-A793A0FDAFC2}"/>
-              </a:ext>
-            </a:extLst>
-          </p:cNvPr>
-          <p:cNvPicPr>
-            <a:picLocks noGrp="1" noChangeAspect="1"/>
-          </p:cNvPicPr>
-          <p:nvPr>
-            <p:ph idx="1"/>
-          </p:nvPr>
-        </p:nvPicPr>
-        <p:blipFill>
-          <a:blip r:embed="rId2"/>
-          <a:stretch>
-            <a:fillRect/>
-          </a:stretch>
-        </p:blipFill>
-        <p:spPr>
-          <a:xfrm>
-            <a:off x="1667089" y="371435"/>
-            <a:ext cx="8857821" cy="6115130"/>
-          </a:xfrm>
-        </p:spPr>
-      </p:pic>
       <p:sp>
         <p:nvSpPr>
           <p:cNvPr id="6" name="Title 1">
@@ -13858,14 +13829,15 @@
         </p:nvSpPr>
         <p:spPr>
           <a:xfrm>
-            <a:off x="106877" y="6008914"/>
-            <a:ext cx="5391397" cy="706964"/>
+            <a:off x="0" y="0"/>
+            <a:ext cx="2624447" cy="1128347"/>
           </a:xfrm>
         </p:spPr>
         <p:txBody>
           <a:bodyPr/>
           <a:lstStyle/>
           <a:p>
+            <a:pPr algn="ctr"/>
             <a:r>
               <a:rPr lang="en-US" dirty="0">
                 <a:solidFill>
@@ -13875,11 +13847,67 @@
                   </a:schemeClr>
                 </a:solidFill>
               </a:rPr>
-              <a:t>ERD – Plaintext</a:t>
+              <a:t>ERD</a:t>
+            </a:r>
+            <a:br>
+              <a:rPr lang="en-US" dirty="0">
+                <a:solidFill>
+                  <a:schemeClr val="tx1">
+                    <a:lumMod val="75000"/>
+                    <a:lumOff val="25000"/>
+                  </a:schemeClr>
+                </a:solidFill>
+              </a:rPr>
+            </a:br>
+            <a:r>
+              <a:rPr lang="en-US" dirty="0">
+                <a:solidFill>
+                  <a:schemeClr val="tx1">
+                    <a:lumMod val="75000"/>
+                    <a:lumOff val="25000"/>
+                  </a:schemeClr>
+                </a:solidFill>
+              </a:rPr>
+              <a:t>Plaintext</a:t>
             </a:r>
           </a:p>
         </p:txBody>
       </p:sp>
+      <p:pic>
+        <p:nvPicPr>
+          <p:cNvPr id="5" name="Content Placeholder 4">
+            <a:extLst>
+              <a:ext uri="{FF2B5EF4-FFF2-40B4-BE49-F238E27FC236}">
+                <a16:creationId xmlns:a16="http://schemas.microsoft.com/office/drawing/2014/main" id="{23C32D09-AE11-0343-A6CA-9C4BDDCACD2B}"/>
+              </a:ext>
+            </a:extLst>
+          </p:cNvPr>
+          <p:cNvPicPr>
+            <a:picLocks noGrp="1" noChangeAspect="1"/>
+          </p:cNvPicPr>
+          <p:nvPr>
+            <p:ph idx="1"/>
+          </p:nvPr>
+        </p:nvPicPr>
+        <p:blipFill>
+          <a:blip r:embed="rId2">
+            <a:extLst>
+              <a:ext uri="{96DAC541-7B7A-43D3-8B79-37D633B846F1}">
+                <asvg:svgBlip xmlns:asvg="http://schemas.microsoft.com/office/drawing/2016/SVG/main" r:embed="rId3"/>
+              </a:ext>
+            </a:extLst>
+          </a:blip>
+          <a:stretch>
+            <a:fillRect/>
+          </a:stretch>
+        </p:blipFill>
+        <p:spPr>
+          <a:xfrm>
+            <a:off x="2718241" y="71061"/>
+            <a:ext cx="9366882" cy="6715878"/>
+          </a:xfrm>
+        </p:spPr>
+      </p:pic>
     </p:spTree>
     <p:extLst>
       <p:ext uri="{BB962C8B-B14F-4D97-AF65-F5344CB8AC3E}">
@@ -13912,10 +13940,10 @@
       </p:grpSpPr>
       <p:pic>
         <p:nvPicPr>
-          <p:cNvPr id="5" name="Content Placeholder 4">
+          <p:cNvPr id="10" name="Content Placeholder 9">
             <a:extLst>
               <a:ext uri="{FF2B5EF4-FFF2-40B4-BE49-F238E27FC236}">
-                <a16:creationId xmlns:a16="http://schemas.microsoft.com/office/drawing/2014/main" id="{BAF5B7F8-1AD8-FA4B-8ABE-6FA84E2D7D2F}"/>
+                <a16:creationId xmlns:a16="http://schemas.microsoft.com/office/drawing/2014/main" id="{8EE2EA51-EA82-854F-8ADD-48FE73FA6AA7}"/>
               </a:ext>
             </a:extLst>
           </p:cNvPr>
@@ -13940,17 +13968,17 @@
         </p:blipFill>
         <p:spPr>
           <a:xfrm>
-            <a:off x="1637438" y="310709"/>
-            <a:ext cx="8860536" cy="6197006"/>
+            <a:off x="2727367" y="71060"/>
+            <a:ext cx="9357756" cy="6709335"/>
           </a:xfrm>
         </p:spPr>
       </p:pic>
       <p:sp>
         <p:nvSpPr>
-          <p:cNvPr id="6" name="Title 1">
+          <p:cNvPr id="12" name="Title 1">
             <a:extLst>
               <a:ext uri="{FF2B5EF4-FFF2-40B4-BE49-F238E27FC236}">
-                <a16:creationId xmlns:a16="http://schemas.microsoft.com/office/drawing/2014/main" id="{AE7FD0B8-2022-6749-B3E4-B440A0668115}"/>
+                <a16:creationId xmlns:a16="http://schemas.microsoft.com/office/drawing/2014/main" id="{D1FE78DA-E89A-944B-805A-CFC60348C25D}"/>
               </a:ext>
             </a:extLst>
           </p:cNvPr>
@@ -13963,14 +13991,15 @@
         </p:nvSpPr>
         <p:spPr>
           <a:xfrm>
-            <a:off x="106878" y="6008914"/>
-            <a:ext cx="4073236" cy="706964"/>
+            <a:off x="0" y="0"/>
+            <a:ext cx="2620489" cy="1128347"/>
           </a:xfrm>
         </p:spPr>
         <p:txBody>
           <a:bodyPr/>
           <a:lstStyle/>
           <a:p>
+            <a:pPr algn="ctr"/>
             <a:r>
               <a:rPr lang="en-US" dirty="0">
                 <a:solidFill>
@@ -13980,7 +14009,28 @@
                   </a:schemeClr>
                 </a:solidFill>
               </a:rPr>
-              <a:t>ERD - Encrypted</a:t>
+              <a:t>ERD</a:t>
+            </a:r>
+            <a:br>
+              <a:rPr lang="en-US" dirty="0">
+                <a:solidFill>
+                  <a:schemeClr val="tx1">
+                    <a:lumMod val="75000"/>
+                    <a:lumOff val="25000"/>
+                  </a:schemeClr>
+                </a:solidFill>
+              </a:rPr>
+            </a:br>
+            <a:r>
+              <a:rPr lang="en-US" dirty="0">
+                <a:solidFill>
+                  <a:schemeClr val="tx1">
+                    <a:lumMod val="75000"/>
+                    <a:lumOff val="25000"/>
+                  </a:schemeClr>
+                </a:solidFill>
+              </a:rPr>
+              <a:t>Encrypted</a:t>
             </a:r>
           </a:p>
         </p:txBody>

</xml_diff>

<commit_message>
Removed ERDs from the next meeting presentation.
</commit_message>
<xml_diff>
--- a/docs/Meetings/2/2.pptx
+++ b/docs/Meetings/2/2.pptx
@@ -16,8 +16,6 @@
     <p:sldId id="262" r:id="rId10"/>
     <p:sldId id="266" r:id="rId11"/>
     <p:sldId id="264" r:id="rId12"/>
-    <p:sldId id="268" r:id="rId13"/>
-    <p:sldId id="267" r:id="rId14"/>
   </p:sldIdLst>
   <p:sldSz cx="12192000" cy="6858000"/>
   <p:notesSz cx="6858000" cy="9144000"/>
@@ -459,7 +457,7 @@
           <a:p>
             <a:fld id="{5930266A-47E2-AD46-80FA-AF9BB5BD36C8}" type="datetimeFigureOut">
               <a:rPr lang="en-US" smtClean="0"/>
-              <a:t>10/28/21</a:t>
+              <a:t>10/31/21</a:t>
             </a:fld>
             <a:endParaRPr lang="en-US"/>
           </a:p>
@@ -1547,7 +1545,7 @@
           <a:p>
             <a:fld id="{5930266A-47E2-AD46-80FA-AF9BB5BD36C8}" type="datetimeFigureOut">
               <a:rPr lang="en-US" smtClean="0"/>
-              <a:t>10/28/21</a:t>
+              <a:t>10/31/21</a:t>
             </a:fld>
             <a:endParaRPr lang="en-US"/>
           </a:p>
@@ -2527,7 +2525,7 @@
           <a:p>
             <a:fld id="{5930266A-47E2-AD46-80FA-AF9BB5BD36C8}" type="datetimeFigureOut">
               <a:rPr lang="en-US" smtClean="0"/>
-              <a:t>10/28/21</a:t>
+              <a:t>10/31/21</a:t>
             </a:fld>
             <a:endParaRPr lang="en-US"/>
           </a:p>
@@ -3661,7 +3659,7 @@
           <a:p>
             <a:fld id="{5930266A-47E2-AD46-80FA-AF9BB5BD36C8}" type="datetimeFigureOut">
               <a:rPr lang="en-US" smtClean="0"/>
-              <a:t>10/28/21</a:t>
+              <a:t>10/31/21</a:t>
             </a:fld>
             <a:endParaRPr lang="en-US"/>
           </a:p>
@@ -4694,7 +4692,7 @@
           <a:p>
             <a:fld id="{5930266A-47E2-AD46-80FA-AF9BB5BD36C8}" type="datetimeFigureOut">
               <a:rPr lang="en-US" smtClean="0"/>
-              <a:t>10/28/21</a:t>
+              <a:t>10/31/21</a:t>
             </a:fld>
             <a:endParaRPr lang="en-US"/>
           </a:p>
@@ -5354,7 +5352,7 @@
           <a:p>
             <a:fld id="{5930266A-47E2-AD46-80FA-AF9BB5BD36C8}" type="datetimeFigureOut">
               <a:rPr lang="en-US" smtClean="0"/>
-              <a:t>10/28/21</a:t>
+              <a:t>10/31/21</a:t>
             </a:fld>
             <a:endParaRPr lang="en-US"/>
           </a:p>
@@ -6215,7 +6213,7 @@
           <a:p>
             <a:fld id="{5930266A-47E2-AD46-80FA-AF9BB5BD36C8}" type="datetimeFigureOut">
               <a:rPr lang="en-US" smtClean="0"/>
-              <a:t>10/28/21</a:t>
+              <a:t>10/31/21</a:t>
             </a:fld>
             <a:endParaRPr lang="en-US"/>
           </a:p>
@@ -6405,7 +6403,7 @@
           <a:p>
             <a:fld id="{5930266A-47E2-AD46-80FA-AF9BB5BD36C8}" type="datetimeFigureOut">
               <a:rPr lang="en-US" smtClean="0"/>
-              <a:t>10/28/21</a:t>
+              <a:t>10/31/21</a:t>
             </a:fld>
             <a:endParaRPr lang="en-US"/>
           </a:p>
@@ -7377,7 +7375,7 @@
           <a:p>
             <a:fld id="{5930266A-47E2-AD46-80FA-AF9BB5BD36C8}" type="datetimeFigureOut">
               <a:rPr lang="en-US" smtClean="0"/>
-              <a:t>10/28/21</a:t>
+              <a:t>10/31/21</a:t>
             </a:fld>
             <a:endParaRPr lang="en-US"/>
           </a:p>
@@ -7588,7 +7586,7 @@
           <a:p>
             <a:fld id="{5930266A-47E2-AD46-80FA-AF9BB5BD36C8}" type="datetimeFigureOut">
               <a:rPr lang="en-US" smtClean="0"/>
-              <a:t>10/28/21</a:t>
+              <a:t>10/31/21</a:t>
             </a:fld>
             <a:endParaRPr lang="en-US"/>
           </a:p>
@@ -8622,7 +8620,7 @@
           <a:p>
             <a:fld id="{5930266A-47E2-AD46-80FA-AF9BB5BD36C8}" type="datetimeFigureOut">
               <a:rPr lang="en-US" smtClean="0"/>
-              <a:t>10/28/21</a:t>
+              <a:t>10/31/21</a:t>
             </a:fld>
             <a:endParaRPr lang="en-US"/>
           </a:p>
@@ -8894,7 +8892,7 @@
           <a:p>
             <a:fld id="{5930266A-47E2-AD46-80FA-AF9BB5BD36C8}" type="datetimeFigureOut">
               <a:rPr lang="en-US" smtClean="0"/>
-              <a:t>10/28/21</a:t>
+              <a:t>10/31/21</a:t>
             </a:fld>
             <a:endParaRPr lang="en-US"/>
           </a:p>
@@ -9304,7 +9302,7 @@
           <a:p>
             <a:fld id="{5930266A-47E2-AD46-80FA-AF9BB5BD36C8}" type="datetimeFigureOut">
               <a:rPr lang="en-US" smtClean="0"/>
-              <a:t>10/28/21</a:t>
+              <a:t>10/31/21</a:t>
             </a:fld>
             <a:endParaRPr lang="en-US"/>
           </a:p>
@@ -9431,7 +9429,7 @@
           <a:p>
             <a:fld id="{5930266A-47E2-AD46-80FA-AF9BB5BD36C8}" type="datetimeFigureOut">
               <a:rPr lang="en-US" smtClean="0"/>
-              <a:t>10/28/21</a:t>
+              <a:t>10/31/21</a:t>
             </a:fld>
             <a:endParaRPr lang="en-US"/>
           </a:p>
@@ -9526,7 +9524,7 @@
           <a:p>
             <a:fld id="{5930266A-47E2-AD46-80FA-AF9BB5BD36C8}" type="datetimeFigureOut">
               <a:rPr lang="en-US" smtClean="0"/>
-              <a:t>10/28/21</a:t>
+              <a:t>10/31/21</a:t>
             </a:fld>
             <a:endParaRPr lang="en-US"/>
           </a:p>
@@ -10607,7 +10605,7 @@
           <a:p>
             <a:fld id="{5930266A-47E2-AD46-80FA-AF9BB5BD36C8}" type="datetimeFigureOut">
               <a:rPr lang="en-US" smtClean="0"/>
-              <a:t>10/28/21</a:t>
+              <a:t>10/31/21</a:t>
             </a:fld>
             <a:endParaRPr lang="en-US"/>
           </a:p>
@@ -11715,7 +11713,7 @@
           <a:p>
             <a:fld id="{5930266A-47E2-AD46-80FA-AF9BB5BD36C8}" type="datetimeFigureOut">
               <a:rPr lang="en-US" smtClean="0"/>
-              <a:t>10/28/21</a:t>
+              <a:t>10/31/21</a:t>
             </a:fld>
             <a:endParaRPr lang="en-US"/>
           </a:p>
@@ -12712,7 +12710,7 @@
           <a:p>
             <a:fld id="{5930266A-47E2-AD46-80FA-AF9BB5BD36C8}" type="datetimeFigureOut">
               <a:rPr lang="en-US" smtClean="0"/>
-              <a:t>10/28/21</a:t>
+              <a:t>10/31/21</a:t>
             </a:fld>
             <a:endParaRPr lang="en-US"/>
           </a:p>
@@ -13794,260 +13792,6 @@
 </p:sld>
 </file>
 
-<file path=ppt/slides/slide12.xml><?xml version="1.0" encoding="utf-8"?>
-<p:sld xmlns:a="http://schemas.openxmlformats.org/drawingml/2006/main" xmlns:r="http://schemas.openxmlformats.org/officeDocument/2006/relationships" xmlns:p="http://schemas.openxmlformats.org/presentationml/2006/main" showMasterSp="0">
-  <p:cSld>
-    <p:spTree>
-      <p:nvGrpSpPr>
-        <p:cNvPr id="1" name=""/>
-        <p:cNvGrpSpPr/>
-        <p:nvPr/>
-      </p:nvGrpSpPr>
-      <p:grpSpPr>
-        <a:xfrm>
-          <a:off x="0" y="0"/>
-          <a:ext cx="0" cy="0"/>
-          <a:chOff x="0" y="0"/>
-          <a:chExt cx="0" cy="0"/>
-        </a:xfrm>
-      </p:grpSpPr>
-      <p:sp>
-        <p:nvSpPr>
-          <p:cNvPr id="6" name="Title 1">
-            <a:extLst>
-              <a:ext uri="{FF2B5EF4-FFF2-40B4-BE49-F238E27FC236}">
-                <a16:creationId xmlns:a16="http://schemas.microsoft.com/office/drawing/2014/main" id="{AE7FD0B8-2022-6749-B3E4-B440A0668115}"/>
-              </a:ext>
-            </a:extLst>
-          </p:cNvPr>
-          <p:cNvSpPr>
-            <a:spLocks noGrp="1"/>
-          </p:cNvSpPr>
-          <p:nvPr>
-            <p:ph type="title"/>
-          </p:nvPr>
-        </p:nvSpPr>
-        <p:spPr>
-          <a:xfrm>
-            <a:off x="0" y="0"/>
-            <a:ext cx="2624447" cy="1128347"/>
-          </a:xfrm>
-        </p:spPr>
-        <p:txBody>
-          <a:bodyPr/>
-          <a:lstStyle/>
-          <a:p>
-            <a:pPr algn="ctr"/>
-            <a:r>
-              <a:rPr lang="en-US" dirty="0">
-                <a:solidFill>
-                  <a:schemeClr val="tx1">
-                    <a:lumMod val="75000"/>
-                    <a:lumOff val="25000"/>
-                  </a:schemeClr>
-                </a:solidFill>
-              </a:rPr>
-              <a:t>ERD</a:t>
-            </a:r>
-            <a:br>
-              <a:rPr lang="en-US" dirty="0">
-                <a:solidFill>
-                  <a:schemeClr val="tx1">
-                    <a:lumMod val="75000"/>
-                    <a:lumOff val="25000"/>
-                  </a:schemeClr>
-                </a:solidFill>
-              </a:rPr>
-            </a:br>
-            <a:r>
-              <a:rPr lang="en-US" dirty="0">
-                <a:solidFill>
-                  <a:schemeClr val="tx1">
-                    <a:lumMod val="75000"/>
-                    <a:lumOff val="25000"/>
-                  </a:schemeClr>
-                </a:solidFill>
-              </a:rPr>
-              <a:t>Plaintext</a:t>
-            </a:r>
-          </a:p>
-        </p:txBody>
-      </p:sp>
-      <p:pic>
-        <p:nvPicPr>
-          <p:cNvPr id="5" name="Content Placeholder 4">
-            <a:extLst>
-              <a:ext uri="{FF2B5EF4-FFF2-40B4-BE49-F238E27FC236}">
-                <a16:creationId xmlns:a16="http://schemas.microsoft.com/office/drawing/2014/main" id="{23C32D09-AE11-0343-A6CA-9C4BDDCACD2B}"/>
-              </a:ext>
-            </a:extLst>
-          </p:cNvPr>
-          <p:cNvPicPr>
-            <a:picLocks noGrp="1" noChangeAspect="1"/>
-          </p:cNvPicPr>
-          <p:nvPr>
-            <p:ph idx="1"/>
-          </p:nvPr>
-        </p:nvPicPr>
-        <p:blipFill>
-          <a:blip r:embed="rId2">
-            <a:extLst>
-              <a:ext uri="{96DAC541-7B7A-43D3-8B79-37D633B846F1}">
-                <asvg:svgBlip xmlns:asvg="http://schemas.microsoft.com/office/drawing/2016/SVG/main" r:embed="rId3"/>
-              </a:ext>
-            </a:extLst>
-          </a:blip>
-          <a:stretch>
-            <a:fillRect/>
-          </a:stretch>
-        </p:blipFill>
-        <p:spPr>
-          <a:xfrm>
-            <a:off x="2718241" y="71061"/>
-            <a:ext cx="9366882" cy="6715878"/>
-          </a:xfrm>
-        </p:spPr>
-      </p:pic>
-    </p:spTree>
-    <p:extLst>
-      <p:ext uri="{BB962C8B-B14F-4D97-AF65-F5344CB8AC3E}">
-        <p14:creationId xmlns:p14="http://schemas.microsoft.com/office/powerpoint/2010/main" val="649861860"/>
-      </p:ext>
-    </p:extLst>
-  </p:cSld>
-  <p:clrMapOvr>
-    <a:masterClrMapping/>
-  </p:clrMapOvr>
-</p:sld>
-</file>
-
-<file path=ppt/slides/slide13.xml><?xml version="1.0" encoding="utf-8"?>
-<p:sld xmlns:a="http://schemas.openxmlformats.org/drawingml/2006/main" xmlns:r="http://schemas.openxmlformats.org/officeDocument/2006/relationships" xmlns:p="http://schemas.openxmlformats.org/presentationml/2006/main" showMasterSp="0">
-  <p:cSld>
-    <p:spTree>
-      <p:nvGrpSpPr>
-        <p:cNvPr id="1" name=""/>
-        <p:cNvGrpSpPr/>
-        <p:nvPr/>
-      </p:nvGrpSpPr>
-      <p:grpSpPr>
-        <a:xfrm>
-          <a:off x="0" y="0"/>
-          <a:ext cx="0" cy="0"/>
-          <a:chOff x="0" y="0"/>
-          <a:chExt cx="0" cy="0"/>
-        </a:xfrm>
-      </p:grpSpPr>
-      <p:pic>
-        <p:nvPicPr>
-          <p:cNvPr id="10" name="Content Placeholder 9">
-            <a:extLst>
-              <a:ext uri="{FF2B5EF4-FFF2-40B4-BE49-F238E27FC236}">
-                <a16:creationId xmlns:a16="http://schemas.microsoft.com/office/drawing/2014/main" id="{8EE2EA51-EA82-854F-8ADD-48FE73FA6AA7}"/>
-              </a:ext>
-            </a:extLst>
-          </p:cNvPr>
-          <p:cNvPicPr>
-            <a:picLocks noGrp="1" noChangeAspect="1"/>
-          </p:cNvPicPr>
-          <p:nvPr>
-            <p:ph idx="1"/>
-          </p:nvPr>
-        </p:nvPicPr>
-        <p:blipFill>
-          <a:blip r:embed="rId2">
-            <a:extLst>
-              <a:ext uri="{96DAC541-7B7A-43D3-8B79-37D633B846F1}">
-                <asvg:svgBlip xmlns:asvg="http://schemas.microsoft.com/office/drawing/2016/SVG/main" r:embed="rId3"/>
-              </a:ext>
-            </a:extLst>
-          </a:blip>
-          <a:stretch>
-            <a:fillRect/>
-          </a:stretch>
-        </p:blipFill>
-        <p:spPr>
-          <a:xfrm>
-            <a:off x="2727367" y="71060"/>
-            <a:ext cx="9357756" cy="6709335"/>
-          </a:xfrm>
-        </p:spPr>
-      </p:pic>
-      <p:sp>
-        <p:nvSpPr>
-          <p:cNvPr id="12" name="Title 1">
-            <a:extLst>
-              <a:ext uri="{FF2B5EF4-FFF2-40B4-BE49-F238E27FC236}">
-                <a16:creationId xmlns:a16="http://schemas.microsoft.com/office/drawing/2014/main" id="{D1FE78DA-E89A-944B-805A-CFC60348C25D}"/>
-              </a:ext>
-            </a:extLst>
-          </p:cNvPr>
-          <p:cNvSpPr>
-            <a:spLocks noGrp="1"/>
-          </p:cNvSpPr>
-          <p:nvPr>
-            <p:ph type="title"/>
-          </p:nvPr>
-        </p:nvSpPr>
-        <p:spPr>
-          <a:xfrm>
-            <a:off x="0" y="0"/>
-            <a:ext cx="2620489" cy="1128347"/>
-          </a:xfrm>
-        </p:spPr>
-        <p:txBody>
-          <a:bodyPr/>
-          <a:lstStyle/>
-          <a:p>
-            <a:pPr algn="ctr"/>
-            <a:r>
-              <a:rPr lang="en-US" dirty="0">
-                <a:solidFill>
-                  <a:schemeClr val="tx1">
-                    <a:lumMod val="75000"/>
-                    <a:lumOff val="25000"/>
-                  </a:schemeClr>
-                </a:solidFill>
-              </a:rPr>
-              <a:t>ERD</a:t>
-            </a:r>
-            <a:br>
-              <a:rPr lang="en-US" dirty="0">
-                <a:solidFill>
-                  <a:schemeClr val="tx1">
-                    <a:lumMod val="75000"/>
-                    <a:lumOff val="25000"/>
-                  </a:schemeClr>
-                </a:solidFill>
-              </a:rPr>
-            </a:br>
-            <a:r>
-              <a:rPr lang="en-US" dirty="0">
-                <a:solidFill>
-                  <a:schemeClr val="tx1">
-                    <a:lumMod val="75000"/>
-                    <a:lumOff val="25000"/>
-                  </a:schemeClr>
-                </a:solidFill>
-              </a:rPr>
-              <a:t>Encrypted</a:t>
-            </a:r>
-          </a:p>
-        </p:txBody>
-      </p:sp>
-    </p:spTree>
-    <p:extLst>
-      <p:ext uri="{BB962C8B-B14F-4D97-AF65-F5344CB8AC3E}">
-        <p14:creationId xmlns:p14="http://schemas.microsoft.com/office/powerpoint/2010/main" val="130188867"/>
-      </p:ext>
-    </p:extLst>
-  </p:cSld>
-  <p:clrMapOvr>
-    <a:masterClrMapping/>
-  </p:clrMapOvr>
-</p:sld>
-</file>
-
 <file path=ppt/slides/slide2.xml><?xml version="1.0" encoding="utf-8"?>
 <p:sld xmlns:a="http://schemas.openxmlformats.org/drawingml/2006/main" xmlns:r="http://schemas.openxmlformats.org/officeDocument/2006/relationships" xmlns:p="http://schemas.openxmlformats.org/presentationml/2006/main">
   <p:cSld>

</xml_diff>

<commit_message>
Improved upon the PowerPoint presentation of the second meeting.
</commit_message>
<xml_diff>
--- a/docs/Meetings/2/2.pptx
+++ b/docs/Meetings/2/2.pptx
@@ -11,11 +11,11 @@
     <p:sldId id="258" r:id="rId5"/>
     <p:sldId id="260" r:id="rId6"/>
     <p:sldId id="259" r:id="rId7"/>
-    <p:sldId id="263" r:id="rId8"/>
-    <p:sldId id="261" r:id="rId9"/>
-    <p:sldId id="262" r:id="rId10"/>
-    <p:sldId id="266" r:id="rId11"/>
-    <p:sldId id="264" r:id="rId12"/>
+    <p:sldId id="267" r:id="rId8"/>
+    <p:sldId id="263" r:id="rId9"/>
+    <p:sldId id="261" r:id="rId10"/>
+    <p:sldId id="262" r:id="rId11"/>
+    <p:sldId id="266" r:id="rId12"/>
   </p:sldIdLst>
   <p:sldSz cx="12192000" cy="6858000"/>
   <p:notesSz cx="6858000" cy="9144000"/>
@@ -457,7 +457,7 @@
           <a:p>
             <a:fld id="{5930266A-47E2-AD46-80FA-AF9BB5BD36C8}" type="datetimeFigureOut">
               <a:rPr lang="en-US" smtClean="0"/>
-              <a:t>10/31/21</a:t>
+              <a:t>11/4/21</a:t>
             </a:fld>
             <a:endParaRPr lang="en-US"/>
           </a:p>
@@ -1545,7 +1545,7 @@
           <a:p>
             <a:fld id="{5930266A-47E2-AD46-80FA-AF9BB5BD36C8}" type="datetimeFigureOut">
               <a:rPr lang="en-US" smtClean="0"/>
-              <a:t>10/31/21</a:t>
+              <a:t>11/4/21</a:t>
             </a:fld>
             <a:endParaRPr lang="en-US"/>
           </a:p>
@@ -2525,7 +2525,7 @@
           <a:p>
             <a:fld id="{5930266A-47E2-AD46-80FA-AF9BB5BD36C8}" type="datetimeFigureOut">
               <a:rPr lang="en-US" smtClean="0"/>
-              <a:t>10/31/21</a:t>
+              <a:t>11/4/21</a:t>
             </a:fld>
             <a:endParaRPr lang="en-US"/>
           </a:p>
@@ -3659,7 +3659,7 @@
           <a:p>
             <a:fld id="{5930266A-47E2-AD46-80FA-AF9BB5BD36C8}" type="datetimeFigureOut">
               <a:rPr lang="en-US" smtClean="0"/>
-              <a:t>10/31/21</a:t>
+              <a:t>11/4/21</a:t>
             </a:fld>
             <a:endParaRPr lang="en-US"/>
           </a:p>
@@ -4692,7 +4692,7 @@
           <a:p>
             <a:fld id="{5930266A-47E2-AD46-80FA-AF9BB5BD36C8}" type="datetimeFigureOut">
               <a:rPr lang="en-US" smtClean="0"/>
-              <a:t>10/31/21</a:t>
+              <a:t>11/4/21</a:t>
             </a:fld>
             <a:endParaRPr lang="en-US"/>
           </a:p>
@@ -5352,7 +5352,7 @@
           <a:p>
             <a:fld id="{5930266A-47E2-AD46-80FA-AF9BB5BD36C8}" type="datetimeFigureOut">
               <a:rPr lang="en-US" smtClean="0"/>
-              <a:t>10/31/21</a:t>
+              <a:t>11/4/21</a:t>
             </a:fld>
             <a:endParaRPr lang="en-US"/>
           </a:p>
@@ -6213,7 +6213,7 @@
           <a:p>
             <a:fld id="{5930266A-47E2-AD46-80FA-AF9BB5BD36C8}" type="datetimeFigureOut">
               <a:rPr lang="en-US" smtClean="0"/>
-              <a:t>10/31/21</a:t>
+              <a:t>11/4/21</a:t>
             </a:fld>
             <a:endParaRPr lang="en-US"/>
           </a:p>
@@ -6403,7 +6403,7 @@
           <a:p>
             <a:fld id="{5930266A-47E2-AD46-80FA-AF9BB5BD36C8}" type="datetimeFigureOut">
               <a:rPr lang="en-US" smtClean="0"/>
-              <a:t>10/31/21</a:t>
+              <a:t>11/4/21</a:t>
             </a:fld>
             <a:endParaRPr lang="en-US"/>
           </a:p>
@@ -7375,7 +7375,7 @@
           <a:p>
             <a:fld id="{5930266A-47E2-AD46-80FA-AF9BB5BD36C8}" type="datetimeFigureOut">
               <a:rPr lang="en-US" smtClean="0"/>
-              <a:t>10/31/21</a:t>
+              <a:t>11/4/21</a:t>
             </a:fld>
             <a:endParaRPr lang="en-US"/>
           </a:p>
@@ -7586,7 +7586,7 @@
           <a:p>
             <a:fld id="{5930266A-47E2-AD46-80FA-AF9BB5BD36C8}" type="datetimeFigureOut">
               <a:rPr lang="en-US" smtClean="0"/>
-              <a:t>10/31/21</a:t>
+              <a:t>11/4/21</a:t>
             </a:fld>
             <a:endParaRPr lang="en-US"/>
           </a:p>
@@ -8620,7 +8620,7 @@
           <a:p>
             <a:fld id="{5930266A-47E2-AD46-80FA-AF9BB5BD36C8}" type="datetimeFigureOut">
               <a:rPr lang="en-US" smtClean="0"/>
-              <a:t>10/31/21</a:t>
+              <a:t>11/4/21</a:t>
             </a:fld>
             <a:endParaRPr lang="en-US"/>
           </a:p>
@@ -8892,7 +8892,7 @@
           <a:p>
             <a:fld id="{5930266A-47E2-AD46-80FA-AF9BB5BD36C8}" type="datetimeFigureOut">
               <a:rPr lang="en-US" smtClean="0"/>
-              <a:t>10/31/21</a:t>
+              <a:t>11/4/21</a:t>
             </a:fld>
             <a:endParaRPr lang="en-US"/>
           </a:p>
@@ -9302,7 +9302,7 @@
           <a:p>
             <a:fld id="{5930266A-47E2-AD46-80FA-AF9BB5BD36C8}" type="datetimeFigureOut">
               <a:rPr lang="en-US" smtClean="0"/>
-              <a:t>10/31/21</a:t>
+              <a:t>11/4/21</a:t>
             </a:fld>
             <a:endParaRPr lang="en-US"/>
           </a:p>
@@ -9429,7 +9429,7 @@
           <a:p>
             <a:fld id="{5930266A-47E2-AD46-80FA-AF9BB5BD36C8}" type="datetimeFigureOut">
               <a:rPr lang="en-US" smtClean="0"/>
-              <a:t>10/31/21</a:t>
+              <a:t>11/4/21</a:t>
             </a:fld>
             <a:endParaRPr lang="en-US"/>
           </a:p>
@@ -9524,7 +9524,7 @@
           <a:p>
             <a:fld id="{5930266A-47E2-AD46-80FA-AF9BB5BD36C8}" type="datetimeFigureOut">
               <a:rPr lang="en-US" smtClean="0"/>
-              <a:t>10/31/21</a:t>
+              <a:t>11/4/21</a:t>
             </a:fld>
             <a:endParaRPr lang="en-US"/>
           </a:p>
@@ -10605,7 +10605,7 @@
           <a:p>
             <a:fld id="{5930266A-47E2-AD46-80FA-AF9BB5BD36C8}" type="datetimeFigureOut">
               <a:rPr lang="en-US" smtClean="0"/>
-              <a:t>10/31/21</a:t>
+              <a:t>11/4/21</a:t>
             </a:fld>
             <a:endParaRPr lang="en-US"/>
           </a:p>
@@ -11713,7 +11713,7 @@
           <a:p>
             <a:fld id="{5930266A-47E2-AD46-80FA-AF9BB5BD36C8}" type="datetimeFigureOut">
               <a:rPr lang="en-US" smtClean="0"/>
-              <a:t>10/31/21</a:t>
+              <a:t>11/4/21</a:t>
             </a:fld>
             <a:endParaRPr lang="en-US"/>
           </a:p>
@@ -12710,7 +12710,7 @@
           <a:p>
             <a:fld id="{5930266A-47E2-AD46-80FA-AF9BB5BD36C8}" type="datetimeFigureOut">
               <a:rPr lang="en-US" smtClean="0"/>
-              <a:t>10/31/21</a:t>
+              <a:t>11/4/21</a:t>
             </a:fld>
             <a:endParaRPr lang="en-US"/>
           </a:p>
@@ -13339,6 +13339,225 @@
 </file>
 
 <file path=ppt/slides/slide10.xml><?xml version="1.0" encoding="utf-8"?>
+<p:sld xmlns:a="http://schemas.openxmlformats.org/drawingml/2006/main" xmlns:r="http://schemas.openxmlformats.org/officeDocument/2006/relationships" xmlns:p="http://schemas.openxmlformats.org/presentationml/2006/main">
+  <p:cSld>
+    <p:spTree>
+      <p:nvGrpSpPr>
+        <p:cNvPr id="1" name=""/>
+        <p:cNvGrpSpPr/>
+        <p:nvPr/>
+      </p:nvGrpSpPr>
+      <p:grpSpPr>
+        <a:xfrm>
+          <a:off x="0" y="0"/>
+          <a:ext cx="0" cy="0"/>
+          <a:chOff x="0" y="0"/>
+          <a:chExt cx="0" cy="0"/>
+        </a:xfrm>
+      </p:grpSpPr>
+      <p:sp>
+        <p:nvSpPr>
+          <p:cNvPr id="4" name="Rounded Rectangle 3">
+            <a:extLst>
+              <a:ext uri="{FF2B5EF4-FFF2-40B4-BE49-F238E27FC236}">
+                <a16:creationId xmlns:a16="http://schemas.microsoft.com/office/drawing/2014/main" id="{65A2AE13-D8A3-D842-97EA-6176A3ABEDD0}"/>
+              </a:ext>
+            </a:extLst>
+          </p:cNvPr>
+          <p:cNvSpPr/>
+          <p:nvPr/>
+        </p:nvSpPr>
+        <p:spPr>
+          <a:xfrm>
+            <a:off x="597724" y="2603500"/>
+            <a:ext cx="10996551" cy="3491345"/>
+          </a:xfrm>
+          <a:prstGeom prst="roundRect">
+            <a:avLst/>
+          </a:prstGeom>
+          <a:solidFill>
+            <a:schemeClr val="bg1">
+              <a:lumMod val="95000"/>
+            </a:schemeClr>
+          </a:solidFill>
+          <a:ln>
+            <a:noFill/>
+          </a:ln>
+          <a:effectLst>
+            <a:outerShdw blurRad="50800" dist="38100" dir="8100000" algn="tr" rotWithShape="0">
+              <a:prstClr val="black">
+                <a:alpha val="40000"/>
+              </a:prstClr>
+            </a:outerShdw>
+          </a:effectLst>
+        </p:spPr>
+        <p:style>
+          <a:lnRef idx="2">
+            <a:schemeClr val="accent6"/>
+          </a:lnRef>
+          <a:fillRef idx="1">
+            <a:schemeClr val="lt1"/>
+          </a:fillRef>
+          <a:effectRef idx="0">
+            <a:schemeClr val="accent6"/>
+          </a:effectRef>
+          <a:fontRef idx="minor">
+            <a:schemeClr val="dk1"/>
+          </a:fontRef>
+        </p:style>
+        <p:txBody>
+          <a:bodyPr rtlCol="0" anchor="ctr"/>
+          <a:lstStyle/>
+          <a:p>
+            <a:pPr algn="ctr"/>
+            <a:endParaRPr lang="en-US" dirty="0"/>
+          </a:p>
+        </p:txBody>
+      </p:sp>
+      <p:sp>
+        <p:nvSpPr>
+          <p:cNvPr id="2" name="Title 1">
+            <a:extLst>
+              <a:ext uri="{FF2B5EF4-FFF2-40B4-BE49-F238E27FC236}">
+                <a16:creationId xmlns:a16="http://schemas.microsoft.com/office/drawing/2014/main" id="{E636B647-8BC7-8541-ABB2-87BACE4E3FFF}"/>
+              </a:ext>
+            </a:extLst>
+          </p:cNvPr>
+          <p:cNvSpPr>
+            <a:spLocks noGrp="1"/>
+          </p:cNvSpPr>
+          <p:nvPr>
+            <p:ph type="title"/>
+          </p:nvPr>
+        </p:nvSpPr>
+        <p:spPr/>
+        <p:txBody>
+          <a:bodyPr/>
+          <a:lstStyle/>
+          <a:p>
+            <a:r>
+              <a:rPr lang="en-US" dirty="0"/>
+              <a:t>Stakeholder – ”The Average Person”</a:t>
+            </a:r>
+          </a:p>
+        </p:txBody>
+      </p:sp>
+      <p:sp>
+        <p:nvSpPr>
+          <p:cNvPr id="3" name="Content Placeholder 2">
+            <a:extLst>
+              <a:ext uri="{FF2B5EF4-FFF2-40B4-BE49-F238E27FC236}">
+                <a16:creationId xmlns:a16="http://schemas.microsoft.com/office/drawing/2014/main" id="{094AC5A5-6900-644E-BD27-DF45C26CEB79}"/>
+              </a:ext>
+            </a:extLst>
+          </p:cNvPr>
+          <p:cNvSpPr>
+            <a:spLocks noGrp="1"/>
+          </p:cNvSpPr>
+          <p:nvPr>
+            <p:ph idx="1"/>
+          </p:nvPr>
+        </p:nvSpPr>
+        <p:spPr>
+          <a:xfrm>
+            <a:off x="3218213" y="2785423"/>
+            <a:ext cx="6809901" cy="3416300"/>
+          </a:xfrm>
+        </p:spPr>
+        <p:txBody>
+          <a:bodyPr/>
+          <a:lstStyle/>
+          <a:p>
+            <a:pPr marL="0" indent="0">
+              <a:buNone/>
+            </a:pPr>
+            <a:r>
+              <a:rPr lang="en-US" dirty="0"/>
+              <a:t>As a financially responsible and diligent individual, Adam tracks his income, sets reasonable budgets for himself, pays his mortgage, and has certain goals when it comes to saving money. He requires an app that can help him manage his finances, and automate tasks such as calculating whether or not he can afford to partake in an activity that costs money. For example, if he wants to travel next summer, he wants to know how that’d affect his savings, and how much he can afford to spend on various categories of things (food, accommodation etc.) in order to pay for his vacation.</a:t>
+            </a:r>
+          </a:p>
+        </p:txBody>
+      </p:sp>
+      <p:sp>
+        <p:nvSpPr>
+          <p:cNvPr id="5" name="TextBox 4">
+            <a:extLst>
+              <a:ext uri="{FF2B5EF4-FFF2-40B4-BE49-F238E27FC236}">
+                <a16:creationId xmlns:a16="http://schemas.microsoft.com/office/drawing/2014/main" id="{49F5C4CC-6FC3-434C-BDD3-3D4DC3DF7AC8}"/>
+              </a:ext>
+            </a:extLst>
+          </p:cNvPr>
+          <p:cNvSpPr txBox="1"/>
+          <p:nvPr/>
+        </p:nvSpPr>
+        <p:spPr>
+          <a:xfrm>
+            <a:off x="1303780" y="4939760"/>
+            <a:ext cx="914400" cy="369332"/>
+          </a:xfrm>
+          <a:prstGeom prst="rect">
+            <a:avLst/>
+          </a:prstGeom>
+          <a:noFill/>
+        </p:spPr>
+        <p:txBody>
+          <a:bodyPr wrap="square" rtlCol="0">
+            <a:spAutoFit/>
+          </a:bodyPr>
+          <a:lstStyle/>
+          <a:p>
+            <a:pPr algn="ctr"/>
+            <a:r>
+              <a:rPr lang="en-US" b="1" dirty="0"/>
+              <a:t>Adam</a:t>
+            </a:r>
+          </a:p>
+        </p:txBody>
+      </p:sp>
+      <p:pic>
+        <p:nvPicPr>
+          <p:cNvPr id="7" name="Picture 6">
+            <a:extLst>
+              <a:ext uri="{FF2B5EF4-FFF2-40B4-BE49-F238E27FC236}">
+                <a16:creationId xmlns:a16="http://schemas.microsoft.com/office/drawing/2014/main" id="{F0E6E109-91BE-7A48-B525-4F27C72E15C1}"/>
+              </a:ext>
+            </a:extLst>
+          </p:cNvPr>
+          <p:cNvPicPr>
+            <a:picLocks noChangeAspect="1"/>
+          </p:cNvPicPr>
+          <p:nvPr/>
+        </p:nvPicPr>
+        <p:blipFill>
+          <a:blip r:embed="rId2"/>
+          <a:stretch>
+            <a:fillRect/>
+          </a:stretch>
+        </p:blipFill>
+        <p:spPr>
+          <a:xfrm>
+            <a:off x="835025" y="2896175"/>
+            <a:ext cx="1858384" cy="1858384"/>
+          </a:xfrm>
+          <a:prstGeom prst="rect">
+            <a:avLst/>
+          </a:prstGeom>
+        </p:spPr>
+      </p:pic>
+    </p:spTree>
+    <p:extLst>
+      <p:ext uri="{BB962C8B-B14F-4D97-AF65-F5344CB8AC3E}">
+        <p14:creationId xmlns:p14="http://schemas.microsoft.com/office/powerpoint/2010/main" val="1352740615"/>
+      </p:ext>
+    </p:extLst>
+  </p:cSld>
+  <p:clrMapOvr>
+    <a:masterClrMapping/>
+  </p:clrMapOvr>
+</p:sld>
+</file>
+
+<file path=ppt/slides/slide11.xml><?xml version="1.0" encoding="utf-8"?>
 <p:sld xmlns:a="http://schemas.openxmlformats.org/drawingml/2006/main" xmlns:r="http://schemas.openxmlformats.org/officeDocument/2006/relationships" xmlns:p="http://schemas.openxmlformats.org/presentationml/2006/main" showMasterSp="0">
   <p:cSld>
     <p:spTree>
@@ -13734,64 +13953,6 @@
 </p:sld>
 </file>
 
-<file path=ppt/slides/slide11.xml><?xml version="1.0" encoding="utf-8"?>
-<p:sld xmlns:a="http://schemas.openxmlformats.org/drawingml/2006/main" xmlns:r="http://schemas.openxmlformats.org/officeDocument/2006/relationships" xmlns:p="http://schemas.openxmlformats.org/presentationml/2006/main" showMasterSp="0">
-  <p:cSld>
-    <p:spTree>
-      <p:nvGrpSpPr>
-        <p:cNvPr id="1" name=""/>
-        <p:cNvGrpSpPr/>
-        <p:nvPr/>
-      </p:nvGrpSpPr>
-      <p:grpSpPr>
-        <a:xfrm>
-          <a:off x="0" y="0"/>
-          <a:ext cx="0" cy="0"/>
-          <a:chOff x="0" y="0"/>
-          <a:chExt cx="0" cy="0"/>
-        </a:xfrm>
-      </p:grpSpPr>
-      <p:pic>
-        <p:nvPicPr>
-          <p:cNvPr id="5" name="Content Placeholder 4">
-            <a:extLst>
-              <a:ext uri="{FF2B5EF4-FFF2-40B4-BE49-F238E27FC236}">
-                <a16:creationId xmlns:a16="http://schemas.microsoft.com/office/drawing/2014/main" id="{3C46440A-BAE2-104B-ABB8-5F7E10FAC17A}"/>
-              </a:ext>
-            </a:extLst>
-          </p:cNvPr>
-          <p:cNvPicPr>
-            <a:picLocks noGrp="1" noChangeAspect="1"/>
-          </p:cNvPicPr>
-          <p:nvPr>
-            <p:ph idx="1"/>
-          </p:nvPr>
-        </p:nvPicPr>
-        <p:blipFill rotWithShape="1">
-          <a:blip r:embed="rId2"/>
-          <a:srcRect l="7469"/>
-          <a:stretch/>
-        </p:blipFill>
-        <p:spPr>
-          <a:xfrm>
-            <a:off x="1376548" y="47873"/>
-            <a:ext cx="9438904" cy="6762254"/>
-          </a:xfrm>
-        </p:spPr>
-      </p:pic>
-    </p:spTree>
-    <p:extLst>
-      <p:ext uri="{BB962C8B-B14F-4D97-AF65-F5344CB8AC3E}">
-        <p14:creationId xmlns:p14="http://schemas.microsoft.com/office/powerpoint/2010/main" val="4201427782"/>
-      </p:ext>
-    </p:extLst>
-  </p:cSld>
-  <p:clrMapOvr>
-    <a:masterClrMapping/>
-  </p:clrMapOvr>
-</p:sld>
-</file>
-
 <file path=ppt/slides/slide2.xml><?xml version="1.0" encoding="utf-8"?>
 <p:sld xmlns:a="http://schemas.openxmlformats.org/drawingml/2006/main" xmlns:r="http://schemas.openxmlformats.org/officeDocument/2006/relationships" xmlns:p="http://schemas.openxmlformats.org/presentationml/2006/main">
   <p:cSld>
@@ -13891,7 +14052,7 @@
           <a:p>
             <a:r>
               <a:rPr lang="en-US" dirty="0"/>
-              <a:t>Project Vision</a:t>
+              <a:t>Project Vision - What Is CryptoShare?</a:t>
             </a:r>
           </a:p>
         </p:txBody>
@@ -14171,7 +14332,9 @@
           </a:xfrm>
         </p:spPr>
         <p:txBody>
-          <a:bodyPr/>
+          <a:bodyPr>
+            <a:normAutofit lnSpcReduction="10000"/>
+          </a:bodyPr>
           <a:lstStyle/>
           <a:p>
             <a:pPr marL="0" indent="0">
@@ -14187,7 +14350,7 @@
             </a:r>
             <a:r>
               <a:rPr lang="en-US" dirty="0"/>
-              <a:t>, such as myself at the time, investing in a variety of cryptoassets.</a:t>
+              <a:t>, including myself at the time, investing in a variety of cryptoassets.</a:t>
             </a:r>
           </a:p>
           <a:p>
@@ -14466,7 +14629,7 @@
           <p:cNvPr id="2" name="Title 1">
             <a:extLst>
               <a:ext uri="{FF2B5EF4-FFF2-40B4-BE49-F238E27FC236}">
-                <a16:creationId xmlns:a16="http://schemas.microsoft.com/office/drawing/2014/main" id="{EAB63C0E-0FC6-634C-A8C8-2AD080A93FB6}"/>
+                <a16:creationId xmlns:a16="http://schemas.microsoft.com/office/drawing/2014/main" id="{9776F158-097A-1446-AAB4-80518E0FAC5C}"/>
               </a:ext>
             </a:extLst>
           </p:cNvPr>
@@ -14484,17 +14647,17 @@
           <a:p>
             <a:r>
               <a:rPr lang="en-US" dirty="0"/>
-              <a:t>Stakeholders &amp; Their Importance</a:t>
+              <a:t>Background - Real World Interest</a:t>
             </a:r>
           </a:p>
         </p:txBody>
       </p:sp>
       <p:sp>
         <p:nvSpPr>
-          <p:cNvPr id="3" name="Content Placeholder 2">
+          <p:cNvPr id="4" name="Content Placeholder 3">
             <a:extLst>
               <a:ext uri="{FF2B5EF4-FFF2-40B4-BE49-F238E27FC236}">
-                <a16:creationId xmlns:a16="http://schemas.microsoft.com/office/drawing/2014/main" id="{25339EE8-00B5-E64A-8A6E-830841162431}"/>
+                <a16:creationId xmlns:a16="http://schemas.microsoft.com/office/drawing/2014/main" id="{5AF6A616-1BFA-FB48-94E1-FB6543054160}"/>
               </a:ext>
             </a:extLst>
           </p:cNvPr>
@@ -14507,48 +14670,58 @@
         </p:nvSpPr>
         <p:spPr/>
         <p:txBody>
-          <a:bodyPr>
-            <a:normAutofit lnSpcReduction="10000"/>
-          </a:bodyPr>
+          <a:bodyPr/>
           <a:lstStyle/>
           <a:p>
             <a:r>
               <a:rPr lang="en-US" dirty="0"/>
-              <a:t>CryptoShare would provide functionalities that’d be useful to both professional investors, retail investors, and the average person. </a:t>
+              <a:t>CryptoShare is an expansion of a previous project I developed.</a:t>
             </a:r>
           </a:p>
           <a:p>
             <a:r>
               <a:rPr lang="en-US" dirty="0"/>
-              <a:t>It’s important to know who the main stakeholders are, in order to prevent project management issues…</a:t>
-            </a:r>
-          </a:p>
-          <a:p>
-            <a:r>
-              <a:rPr lang="en-US" dirty="0"/>
-              <a:t>For example, scope creep is prevented by having a set number of features that would be provided. The goal of the project is to provide a private and unified interface </a:t>
-            </a:r>
-            <a:r>
-              <a:rPr lang="en-US"/>
-              <a:t>for the management </a:t>
-            </a:r>
-            <a:r>
-              <a:rPr lang="en-US" dirty="0"/>
-              <a:t>of income, with cryptocurrencies and stocks being the only two investment categories.</a:t>
-            </a:r>
-          </a:p>
-          <a:p>
-            <a:r>
-              <a:rPr lang="en-US" dirty="0"/>
-              <a:t>Similarly, gold plating is also prevented by only providing features that are useful to the majority of stakeholders, rather than developing features that only a handful of users would ever find worthwhile.</a:t>
+              <a:t>The project is currently at around 75,000 downloads, and got a lot of feature requests, suggesting there’s a real market and demand for apps like it. These requests can also serve as an insight into what users want.</a:t>
             </a:r>
           </a:p>
         </p:txBody>
       </p:sp>
+      <p:pic>
+        <p:nvPicPr>
+          <p:cNvPr id="7" name="Picture 6">
+            <a:extLst>
+              <a:ext uri="{FF2B5EF4-FFF2-40B4-BE49-F238E27FC236}">
+                <a16:creationId xmlns:a16="http://schemas.microsoft.com/office/drawing/2014/main" id="{2EE2EF35-A1ED-6D41-820F-05C0810C17E7}"/>
+              </a:ext>
+            </a:extLst>
+          </p:cNvPr>
+          <p:cNvPicPr>
+            <a:picLocks noChangeAspect="1"/>
+          </p:cNvPicPr>
+          <p:nvPr/>
+        </p:nvPicPr>
+        <p:blipFill>
+          <a:blip r:embed="rId2"/>
+          <a:stretch>
+            <a:fillRect/>
+          </a:stretch>
+        </p:blipFill>
+        <p:spPr>
+          <a:xfrm>
+            <a:off x="2258263" y="4029654"/>
+            <a:ext cx="6619039" cy="2592393"/>
+          </a:xfrm>
+          <a:prstGeom prst="roundRect">
+            <a:avLst>
+              <a:gd name="adj" fmla="val 8777"/>
+            </a:avLst>
+          </a:prstGeom>
+        </p:spPr>
+      </p:pic>
     </p:spTree>
     <p:extLst>
       <p:ext uri="{BB962C8B-B14F-4D97-AF65-F5344CB8AC3E}">
-        <p14:creationId xmlns:p14="http://schemas.microsoft.com/office/powerpoint/2010/main" val="3728395366"/>
+        <p14:creationId xmlns:p14="http://schemas.microsoft.com/office/powerpoint/2010/main" val="2374002328"/>
       </p:ext>
     </p:extLst>
   </p:cSld>
@@ -14577,116 +14750,10 @@
       </p:grpSpPr>
       <p:sp>
         <p:nvSpPr>
-          <p:cNvPr id="4" name="Rounded Rectangle 3">
-            <a:extLst>
-              <a:ext uri="{FF2B5EF4-FFF2-40B4-BE49-F238E27FC236}">
-                <a16:creationId xmlns:a16="http://schemas.microsoft.com/office/drawing/2014/main" id="{65A2AE13-D8A3-D842-97EA-6176A3ABEDD0}"/>
-              </a:ext>
-            </a:extLst>
-          </p:cNvPr>
-          <p:cNvSpPr/>
-          <p:nvPr/>
-        </p:nvSpPr>
-        <p:spPr>
-          <a:xfrm>
-            <a:off x="597724" y="2603500"/>
-            <a:ext cx="10996551" cy="3491345"/>
-          </a:xfrm>
-          <a:prstGeom prst="roundRect">
-            <a:avLst/>
-          </a:prstGeom>
-          <a:solidFill>
-            <a:schemeClr val="bg1">
-              <a:lumMod val="95000"/>
-            </a:schemeClr>
-          </a:solidFill>
-          <a:ln>
-            <a:noFill/>
-          </a:ln>
-          <a:effectLst>
-            <a:outerShdw blurRad="50800" dist="38100" dir="8100000" algn="tr" rotWithShape="0">
-              <a:prstClr val="black">
-                <a:alpha val="40000"/>
-              </a:prstClr>
-            </a:outerShdw>
-          </a:effectLst>
-        </p:spPr>
-        <p:style>
-          <a:lnRef idx="2">
-            <a:schemeClr val="accent6"/>
-          </a:lnRef>
-          <a:fillRef idx="1">
-            <a:schemeClr val="lt1"/>
-          </a:fillRef>
-          <a:effectRef idx="0">
-            <a:schemeClr val="accent6"/>
-          </a:effectRef>
-          <a:fontRef idx="minor">
-            <a:schemeClr val="dk1"/>
-          </a:fontRef>
-        </p:style>
-        <p:txBody>
-          <a:bodyPr rtlCol="0" anchor="ctr"/>
-          <a:lstStyle/>
-          <a:p>
-            <a:pPr algn="ctr"/>
-            <a:endParaRPr lang="en-US" dirty="0"/>
-          </a:p>
-        </p:txBody>
-      </p:sp>
-      <p:pic>
-        <p:nvPicPr>
-          <p:cNvPr id="1028" name="Picture 4">
-            <a:extLst>
-              <a:ext uri="{FF2B5EF4-FFF2-40B4-BE49-F238E27FC236}">
-                <a16:creationId xmlns:a16="http://schemas.microsoft.com/office/drawing/2014/main" id="{FD31B43A-E0B0-2749-8D4F-16B6FC4074D8}"/>
-              </a:ext>
-            </a:extLst>
-          </p:cNvPr>
-          <p:cNvPicPr>
-            <a:picLocks noChangeAspect="1" noChangeArrowheads="1"/>
-          </p:cNvPicPr>
-          <p:nvPr/>
-        </p:nvPicPr>
-        <p:blipFill>
-          <a:blip r:embed="rId2">
-            <a:extLst>
-              <a:ext uri="{28A0092B-C50C-407E-A947-70E740481C1C}">
-                <a14:useLocalDpi xmlns:a14="http://schemas.microsoft.com/office/drawing/2010/main" val="0"/>
-              </a:ext>
-            </a:extLst>
-          </a:blip>
-          <a:srcRect/>
-          <a:stretch>
-            <a:fillRect/>
-          </a:stretch>
-        </p:blipFill>
-        <p:spPr bwMode="auto">
-          <a:xfrm>
-            <a:off x="741816" y="2770578"/>
-            <a:ext cx="2038329" cy="2038329"/>
-          </a:xfrm>
-          <a:prstGeom prst="rect">
-            <a:avLst/>
-          </a:prstGeom>
-          <a:noFill/>
-          <a:extLst>
-            <a:ext uri="{909E8E84-426E-40DD-AFC4-6F175D3DCCD1}">
-              <a14:hiddenFill xmlns:a14="http://schemas.microsoft.com/office/drawing/2010/main">
-                <a:solidFill>
-                  <a:srgbClr val="FFFFFF"/>
-                </a:solidFill>
-              </a14:hiddenFill>
-            </a:ext>
-          </a:extLst>
-        </p:spPr>
-      </p:pic>
-      <p:sp>
-        <p:nvSpPr>
           <p:cNvPr id="2" name="Title 1">
             <a:extLst>
               <a:ext uri="{FF2B5EF4-FFF2-40B4-BE49-F238E27FC236}">
-                <a16:creationId xmlns:a16="http://schemas.microsoft.com/office/drawing/2014/main" id="{E636B647-8BC7-8541-ABB2-87BACE4E3FFF}"/>
+                <a16:creationId xmlns:a16="http://schemas.microsoft.com/office/drawing/2014/main" id="{EAB63C0E-0FC6-634C-A8C8-2AD080A93FB6}"/>
               </a:ext>
             </a:extLst>
           </p:cNvPr>
@@ -14704,7 +14771,7 @@
           <a:p>
             <a:r>
               <a:rPr lang="en-US" dirty="0"/>
-              <a:t>Stakeholder – ”The Investor”</a:t>
+              <a:t>Stakeholders &amp; Their Importance</a:t>
             </a:r>
           </a:p>
         </p:txBody>
@@ -14714,7 +14781,7 @@
           <p:cNvPr id="3" name="Content Placeholder 2">
             <a:extLst>
               <a:ext uri="{FF2B5EF4-FFF2-40B4-BE49-F238E27FC236}">
-                <a16:creationId xmlns:a16="http://schemas.microsoft.com/office/drawing/2014/main" id="{094AC5A5-6900-644E-BD27-DF45C26CEB79}"/>
+                <a16:creationId xmlns:a16="http://schemas.microsoft.com/office/drawing/2014/main" id="{25339EE8-00B5-E64A-8A6E-830841162431}"/>
               </a:ext>
             </a:extLst>
           </p:cNvPr>
@@ -14725,58 +14792,28 @@
             <p:ph idx="1"/>
           </p:nvPr>
         </p:nvSpPr>
-        <p:spPr>
-          <a:xfrm>
-            <a:off x="3218213" y="2785423"/>
-            <a:ext cx="6809901" cy="3416300"/>
-          </a:xfrm>
-        </p:spPr>
+        <p:spPr/>
         <p:txBody>
-          <a:bodyPr/>
+          <a:bodyPr>
+            <a:normAutofit/>
+          </a:bodyPr>
           <a:lstStyle/>
           <a:p>
-            <a:pPr marL="0" indent="0">
-              <a:buNone/>
-            </a:pPr>
             <a:r>
               <a:rPr lang="en-US" dirty="0"/>
-              <a:t>As a fairly tech-savvy retail investor in stocks and cryptocurrencies, Eve is aware of how private her financial data is, and how likely it is for proprietary apps to store her details. She doesn’t want to trust “the cloud” with said data. She requires an app that is open-source, so that it can be vetted by other individuals, and an app where she has full control of her data. She’d like to manage her investment portfolio, whether it be stocks or cryptoassets, and be able to see how each market is performing on any given day. She’d like all this data to factor into her income budgeting and financial management.</a:t>
+              <a:t>CryptoShare would provide functionalities that’d be useful to both professional investors, retail investors, and the average person. </a:t>
             </a:r>
           </a:p>
-        </p:txBody>
-      </p:sp>
-      <p:sp>
-        <p:nvSpPr>
-          <p:cNvPr id="5" name="TextBox 4">
-            <a:extLst>
-              <a:ext uri="{FF2B5EF4-FFF2-40B4-BE49-F238E27FC236}">
-                <a16:creationId xmlns:a16="http://schemas.microsoft.com/office/drawing/2014/main" id="{49F5C4CC-6FC3-434C-BDD3-3D4DC3DF7AC8}"/>
-              </a:ext>
-            </a:extLst>
-          </p:cNvPr>
-          <p:cNvSpPr txBox="1"/>
-          <p:nvPr/>
-        </p:nvSpPr>
-        <p:spPr>
-          <a:xfrm>
-            <a:off x="1303780" y="4939760"/>
-            <a:ext cx="914400" cy="369332"/>
-          </a:xfrm>
-          <a:prstGeom prst="rect">
-            <a:avLst/>
-          </a:prstGeom>
-          <a:noFill/>
-        </p:spPr>
-        <p:txBody>
-          <a:bodyPr wrap="square" rtlCol="0">
-            <a:spAutoFit/>
-          </a:bodyPr>
-          <a:lstStyle/>
-          <a:p>
-            <a:pPr algn="ctr"/>
+          <a:p>
             <a:r>
-              <a:rPr lang="en-US" b="1" dirty="0"/>
-              <a:t>Eve</a:t>
+              <a:rPr lang="en-US" dirty="0"/>
+              <a:t>It’s important to know who the main stakeholders are, in order to prevent project management issues such as scope creep or gold plating, by having a set number of features, and only providing features useful to a majority of users rather than continuously adding features that a handful of users might find useful.</a:t>
+            </a:r>
+          </a:p>
+          <a:p>
+            <a:r>
+              <a:rPr lang="en-US" dirty="0"/>
+              <a:t>User personas help with the derivation of user stories and the product backlog.</a:t>
             </a:r>
           </a:p>
         </p:txBody>
@@ -14784,7 +14821,7 @@
     </p:spTree>
     <p:extLst>
       <p:ext uri="{BB962C8B-B14F-4D97-AF65-F5344CB8AC3E}">
-        <p14:creationId xmlns:p14="http://schemas.microsoft.com/office/powerpoint/2010/main" val="3307195744"/>
+        <p14:creationId xmlns:p14="http://schemas.microsoft.com/office/powerpoint/2010/main" val="3728395366"/>
       </p:ext>
     </p:extLst>
   </p:cSld>
@@ -14870,6 +14907,53 @@
           </a:p>
         </p:txBody>
       </p:sp>
+      <p:pic>
+        <p:nvPicPr>
+          <p:cNvPr id="1028" name="Picture 4">
+            <a:extLst>
+              <a:ext uri="{FF2B5EF4-FFF2-40B4-BE49-F238E27FC236}">
+                <a16:creationId xmlns:a16="http://schemas.microsoft.com/office/drawing/2014/main" id="{FD31B43A-E0B0-2749-8D4F-16B6FC4074D8}"/>
+              </a:ext>
+            </a:extLst>
+          </p:cNvPr>
+          <p:cNvPicPr>
+            <a:picLocks noChangeAspect="1" noChangeArrowheads="1"/>
+          </p:cNvPicPr>
+          <p:nvPr/>
+        </p:nvPicPr>
+        <p:blipFill>
+          <a:blip r:embed="rId2">
+            <a:extLst>
+              <a:ext uri="{28A0092B-C50C-407E-A947-70E740481C1C}">
+                <a14:useLocalDpi xmlns:a14="http://schemas.microsoft.com/office/drawing/2010/main" val="0"/>
+              </a:ext>
+            </a:extLst>
+          </a:blip>
+          <a:srcRect/>
+          <a:stretch>
+            <a:fillRect/>
+          </a:stretch>
+        </p:blipFill>
+        <p:spPr bwMode="auto">
+          <a:xfrm>
+            <a:off x="741816" y="2770578"/>
+            <a:ext cx="2038329" cy="2038329"/>
+          </a:xfrm>
+          <a:prstGeom prst="rect">
+            <a:avLst/>
+          </a:prstGeom>
+          <a:noFill/>
+          <a:extLst>
+            <a:ext uri="{909E8E84-426E-40DD-AFC4-6F175D3DCCD1}">
+              <a14:hiddenFill xmlns:a14="http://schemas.microsoft.com/office/drawing/2010/main">
+                <a:solidFill>
+                  <a:srgbClr val="FFFFFF"/>
+                </a:solidFill>
+              </a14:hiddenFill>
+            </a:ext>
+          </a:extLst>
+        </p:spPr>
+      </p:pic>
       <p:sp>
         <p:nvSpPr>
           <p:cNvPr id="2" name="Title 1">
@@ -14893,7 +14977,7 @@
           <a:p>
             <a:r>
               <a:rPr lang="en-US" dirty="0"/>
-              <a:t>Stakeholder – ”The Average Person”</a:t>
+              <a:t>Stakeholder – ”The Investor”</a:t>
             </a:r>
           </a:p>
         </p:txBody>
@@ -14929,7 +15013,7 @@
             </a:pPr>
             <a:r>
               <a:rPr lang="en-US" dirty="0"/>
-              <a:t>As a financially responsible and diligent individual, Adam tracks his income, sets reasonable budgets for himself, pays his mortgage, and has certain goals when it comes to saving money. He requires an app that can help him manage his finances, and automate tasks such as calculating whether or not he can afford to partake in an activity that costs money. For example, if he wants to travel next summer, he wants to know how that’d affect his savings, and how much he can afford to spend on various categories of things (food, accommodation etc.) in order to pay for his vacation.</a:t>
+              <a:t>As a fairly tech-savvy retail investor in stocks and cryptocurrencies, Eve is aware of how private her financial data is, and how likely it is for proprietary apps to store her details. She doesn’t want to trust “the cloud” with said data. She requires an app that is open-source, so that it can be vetted by other individuals, and an app where she has full control of her data. She’d like to manage her investment portfolio, whether it be stocks or cryptoassets, and be able to see how each market is performing on any given day. She’d like all this data to factor into her income budgeting and financial management.</a:t>
             </a:r>
           </a:p>
         </p:txBody>
@@ -14965,45 +15049,15 @@
             <a:pPr algn="ctr"/>
             <a:r>
               <a:rPr lang="en-US" b="1" dirty="0"/>
-              <a:t>Adam</a:t>
+              <a:t>Eve</a:t>
             </a:r>
           </a:p>
         </p:txBody>
       </p:sp>
-      <p:pic>
-        <p:nvPicPr>
-          <p:cNvPr id="7" name="Picture 6">
-            <a:extLst>
-              <a:ext uri="{FF2B5EF4-FFF2-40B4-BE49-F238E27FC236}">
-                <a16:creationId xmlns:a16="http://schemas.microsoft.com/office/drawing/2014/main" id="{F0E6E109-91BE-7A48-B525-4F27C72E15C1}"/>
-              </a:ext>
-            </a:extLst>
-          </p:cNvPr>
-          <p:cNvPicPr>
-            <a:picLocks noChangeAspect="1"/>
-          </p:cNvPicPr>
-          <p:nvPr/>
-        </p:nvPicPr>
-        <p:blipFill>
-          <a:blip r:embed="rId2"/>
-          <a:stretch>
-            <a:fillRect/>
-          </a:stretch>
-        </p:blipFill>
-        <p:spPr>
-          <a:xfrm>
-            <a:off x="835025" y="2896175"/>
-            <a:ext cx="1858384" cy="1858384"/>
-          </a:xfrm>
-          <a:prstGeom prst="rect">
-            <a:avLst/>
-          </a:prstGeom>
-        </p:spPr>
-      </p:pic>
     </p:spTree>
     <p:extLst>
       <p:ext uri="{BB962C8B-B14F-4D97-AF65-F5344CB8AC3E}">
-        <p14:creationId xmlns:p14="http://schemas.microsoft.com/office/powerpoint/2010/main" val="1352740615"/>
+        <p14:creationId xmlns:p14="http://schemas.microsoft.com/office/powerpoint/2010/main" val="3307195744"/>
       </p:ext>
     </p:extLst>
   </p:cSld>

</xml_diff>